<commit_message>
Updated presentation slides with all images and commentary from the team.
</commit_message>
<xml_diff>
--- a/AirBnb Project - Sherin, Neena and Cody.pptx
+++ b/AirBnb Project - Sherin, Neena and Cody.pptx
@@ -5,24 +5,30 @@
     <p:sldMasterId id="2147483648" r:id="rId4"/>
   </p:sldMasterIdLst>
   <p:notesMasterIdLst>
-    <p:notesMasterId r:id="rId17"/>
+    <p:notesMasterId r:id="rId23"/>
   </p:notesMasterIdLst>
   <p:handoutMasterIdLst>
-    <p:handoutMasterId r:id="rId18"/>
+    <p:handoutMasterId r:id="rId24"/>
   </p:handoutMasterIdLst>
   <p:sldIdLst>
     <p:sldId id="2439" r:id="rId5"/>
     <p:sldId id="260" r:id="rId6"/>
     <p:sldId id="2434" r:id="rId7"/>
-    <p:sldId id="258" r:id="rId8"/>
-    <p:sldId id="2442" r:id="rId9"/>
-    <p:sldId id="2433" r:id="rId10"/>
-    <p:sldId id="2445" r:id="rId11"/>
-    <p:sldId id="2446" r:id="rId12"/>
-    <p:sldId id="2444" r:id="rId13"/>
-    <p:sldId id="2438" r:id="rId14"/>
-    <p:sldId id="2441" r:id="rId15"/>
-    <p:sldId id="2443" r:id="rId16"/>
+    <p:sldId id="2447" r:id="rId8"/>
+    <p:sldId id="258" r:id="rId9"/>
+    <p:sldId id="2442" r:id="rId10"/>
+    <p:sldId id="2433" r:id="rId11"/>
+    <p:sldId id="2445" r:id="rId12"/>
+    <p:sldId id="2448" r:id="rId13"/>
+    <p:sldId id="2444" r:id="rId14"/>
+    <p:sldId id="2449" r:id="rId15"/>
+    <p:sldId id="2450" r:id="rId16"/>
+    <p:sldId id="2446" r:id="rId17"/>
+    <p:sldId id="2451" r:id="rId18"/>
+    <p:sldId id="2452" r:id="rId19"/>
+    <p:sldId id="2453" r:id="rId20"/>
+    <p:sldId id="2438" r:id="rId21"/>
+    <p:sldId id="2441" r:id="rId22"/>
   </p:sldIdLst>
   <p:sldSz cx="12192000" cy="6858000"/>
   <p:notesSz cx="6858000" cy="9144000"/>
@@ -819,7 +825,91 @@
           <a:p>
             <a:fld id="{AA3BE989-76B8-4F13-9267-01FDA45C437A}" type="slidenum">
               <a:rPr lang="en-US" smtClean="0"/>
-              <a:t>10</a:t>
+              <a:t>4</a:t>
+            </a:fld>
+            <a:endParaRPr lang="en-US" dirty="0"/>
+          </a:p>
+        </p:txBody>
+      </p:sp>
+    </p:spTree>
+    <p:extLst>
+      <p:ext uri="{BB962C8B-B14F-4D97-AF65-F5344CB8AC3E}">
+        <p14:creationId xmlns:p14="http://schemas.microsoft.com/office/powerpoint/2010/main" val="983787655"/>
+      </p:ext>
+    </p:extLst>
+  </p:cSld>
+  <p:clrMapOvr>
+    <a:masterClrMapping/>
+  </p:clrMapOvr>
+</p:notes>
+</file>
+
+<file path=ppt/notesSlides/notesSlide3.xml><?xml version="1.0" encoding="utf-8"?>
+<p:notes xmlns:a="http://schemas.openxmlformats.org/drawingml/2006/main" xmlns:r="http://schemas.openxmlformats.org/officeDocument/2006/relationships" xmlns:p="http://schemas.openxmlformats.org/presentationml/2006/main">
+  <p:cSld>
+    <p:spTree>
+      <p:nvGrpSpPr>
+        <p:cNvPr id="1" name=""/>
+        <p:cNvGrpSpPr/>
+        <p:nvPr/>
+      </p:nvGrpSpPr>
+      <p:grpSpPr>
+        <a:xfrm>
+          <a:off x="0" y="0"/>
+          <a:ext cx="0" cy="0"/>
+          <a:chOff x="0" y="0"/>
+          <a:chExt cx="0" cy="0"/>
+        </a:xfrm>
+      </p:grpSpPr>
+      <p:sp>
+        <p:nvSpPr>
+          <p:cNvPr id="2" name="Slide Image Placeholder 1"/>
+          <p:cNvSpPr>
+            <a:spLocks noGrp="1" noRot="1" noChangeAspect="1"/>
+          </p:cNvSpPr>
+          <p:nvPr>
+            <p:ph type="sldImg"/>
+          </p:nvPr>
+        </p:nvSpPr>
+        <p:spPr/>
+      </p:sp>
+      <p:sp>
+        <p:nvSpPr>
+          <p:cNvPr id="3" name="Notes Placeholder 2"/>
+          <p:cNvSpPr>
+            <a:spLocks noGrp="1"/>
+          </p:cNvSpPr>
+          <p:nvPr>
+            <p:ph type="body" idx="1"/>
+          </p:nvPr>
+        </p:nvSpPr>
+        <p:spPr/>
+        <p:txBody>
+          <a:bodyPr/>
+          <a:lstStyle/>
+          <a:p>
+            <a:endParaRPr lang="en-US" dirty="0"/>
+          </a:p>
+        </p:txBody>
+      </p:sp>
+      <p:sp>
+        <p:nvSpPr>
+          <p:cNvPr id="4" name="Slide Number Placeholder 3"/>
+          <p:cNvSpPr>
+            <a:spLocks noGrp="1"/>
+          </p:cNvSpPr>
+          <p:nvPr>
+            <p:ph type="sldNum" sz="quarter" idx="5"/>
+          </p:nvPr>
+        </p:nvSpPr>
+        <p:spPr/>
+        <p:txBody>
+          <a:bodyPr/>
+          <a:lstStyle/>
+          <a:p>
+            <a:fld id="{AA3BE989-76B8-4F13-9267-01FDA45C437A}" type="slidenum">
+              <a:rPr lang="en-US" smtClean="0"/>
+              <a:t>17</a:t>
             </a:fld>
             <a:endParaRPr lang="en-US" dirty="0"/>
           </a:p>
@@ -10581,6 +10671,1957 @@
           <a:chExt cx="0" cy="0"/>
         </a:xfrm>
       </p:grpSpPr>
+      <p:pic>
+        <p:nvPicPr>
+          <p:cNvPr id="9" name="Content Placeholder 8" descr="Chart&#10;&#10;Description automatically generated">
+            <a:extLst>
+              <a:ext uri="{FF2B5EF4-FFF2-40B4-BE49-F238E27FC236}">
+                <a16:creationId xmlns:a16="http://schemas.microsoft.com/office/drawing/2014/main" id="{CE246ED8-B3FA-4F65-961E-9E0A4ABFA93E}"/>
+              </a:ext>
+            </a:extLst>
+          </p:cNvPr>
+          <p:cNvPicPr>
+            <a:picLocks noGrp="1" noChangeAspect="1"/>
+          </p:cNvPicPr>
+          <p:nvPr>
+            <p:ph sz="quarter" idx="16"/>
+          </p:nvPr>
+        </p:nvPicPr>
+        <p:blipFill>
+          <a:blip r:embed="rId2"/>
+          <a:stretch>
+            <a:fillRect/>
+          </a:stretch>
+        </p:blipFill>
+        <p:spPr>
+          <a:xfrm>
+            <a:off x="5960296" y="381265"/>
+            <a:ext cx="6020209" cy="5908242"/>
+          </a:xfrm>
+        </p:spPr>
+      </p:pic>
+      <p:sp>
+        <p:nvSpPr>
+          <p:cNvPr id="3" name="Title 2">
+            <a:extLst>
+              <a:ext uri="{FF2B5EF4-FFF2-40B4-BE49-F238E27FC236}">
+                <a16:creationId xmlns:a16="http://schemas.microsoft.com/office/drawing/2014/main" id="{963D3CFB-9ABB-4FCD-82E7-9DE87C226AC1}"/>
+              </a:ext>
+            </a:extLst>
+          </p:cNvPr>
+          <p:cNvSpPr>
+            <a:spLocks noGrp="1"/>
+          </p:cNvSpPr>
+          <p:nvPr>
+            <p:ph type="title"/>
+          </p:nvPr>
+        </p:nvSpPr>
+        <p:spPr>
+          <a:xfrm>
+            <a:off x="611804" y="1105505"/>
+            <a:ext cx="4226024" cy="573989"/>
+          </a:xfrm>
+        </p:spPr>
+        <p:txBody>
+          <a:bodyPr/>
+          <a:lstStyle/>
+          <a:p>
+            <a:r>
+              <a:rPr lang="en-AU" dirty="0" err="1"/>
+              <a:t>AirBnb</a:t>
+            </a:r>
+            <a:r>
+              <a:rPr lang="en-AU" dirty="0"/>
+              <a:t> Room Types for </a:t>
+            </a:r>
+            <a:r>
+              <a:rPr lang="en-AU" dirty="0" err="1"/>
+              <a:t>CIties</a:t>
+            </a:r>
+            <a:endParaRPr lang="en-AU" dirty="0"/>
+          </a:p>
+        </p:txBody>
+      </p:sp>
+      <p:sp>
+        <p:nvSpPr>
+          <p:cNvPr id="4" name="Content Placeholder 3">
+            <a:extLst>
+              <a:ext uri="{FF2B5EF4-FFF2-40B4-BE49-F238E27FC236}">
+                <a16:creationId xmlns:a16="http://schemas.microsoft.com/office/drawing/2014/main" id="{0C9180BE-F25F-46F8-BF1B-4BE6880D120C}"/>
+              </a:ext>
+            </a:extLst>
+          </p:cNvPr>
+          <p:cNvSpPr>
+            <a:spLocks noGrp="1"/>
+          </p:cNvSpPr>
+          <p:nvPr>
+            <p:ph idx="1"/>
+          </p:nvPr>
+        </p:nvSpPr>
+        <p:spPr>
+          <a:xfrm>
+            <a:off x="611804" y="2032939"/>
+            <a:ext cx="4226024" cy="3857329"/>
+          </a:xfrm>
+        </p:spPr>
+        <p:txBody>
+          <a:bodyPr>
+            <a:normAutofit fontScale="92500" lnSpcReduction="20000"/>
+          </a:bodyPr>
+          <a:lstStyle/>
+          <a:p>
+            <a:r>
+              <a:rPr lang="en-US" dirty="0"/>
+              <a:t>Maximum overall listings in </a:t>
+            </a:r>
+            <a:r>
+              <a:rPr lang="en-US" b="1" dirty="0"/>
+              <a:t>City of Melbourne</a:t>
+            </a:r>
+            <a:r>
+              <a:rPr lang="en-US" dirty="0"/>
+              <a:t>.</a:t>
+            </a:r>
+          </a:p>
+          <a:p>
+            <a:r>
+              <a:rPr lang="en-US" dirty="0"/>
+              <a:t>Top 3 Cities  with Entire Homes/Apartments and Private </a:t>
+            </a:r>
+            <a:br>
+              <a:rPr lang="en-US" dirty="0"/>
+            </a:br>
+            <a:r>
+              <a:rPr lang="en-US" dirty="0"/>
+              <a:t>Rooms for years 2019 and 2020</a:t>
+            </a:r>
+            <a:br>
+              <a:rPr lang="en-US" dirty="0"/>
+            </a:br>
+            <a:r>
+              <a:rPr lang="en-US" b="1" dirty="0"/>
+              <a:t>Melbourne, Port Philip, </a:t>
+            </a:r>
+            <a:r>
+              <a:rPr lang="en-US" b="1" dirty="0" err="1"/>
+              <a:t>Yarra</a:t>
+            </a:r>
+            <a:endParaRPr lang="en-US" b="1" dirty="0"/>
+          </a:p>
+          <a:p>
+            <a:r>
+              <a:rPr lang="en-US" dirty="0"/>
+              <a:t>Shared Rooms:</a:t>
+            </a:r>
+            <a:br>
+              <a:rPr lang="en-US" dirty="0"/>
+            </a:br>
+            <a:r>
+              <a:rPr lang="en-US" b="1" dirty="0"/>
+              <a:t>Port Philip </a:t>
+            </a:r>
+            <a:r>
+              <a:rPr lang="en-US" dirty="0"/>
+              <a:t>and </a:t>
+            </a:r>
+            <a:r>
+              <a:rPr lang="en-US" b="1" dirty="0"/>
+              <a:t>Whitehorse</a:t>
+            </a:r>
+            <a:r>
+              <a:rPr lang="en-US" dirty="0"/>
+              <a:t> listings slightly increased </a:t>
+            </a:r>
+            <a:br>
+              <a:rPr lang="en-US" dirty="0"/>
+            </a:br>
+            <a:r>
+              <a:rPr lang="en-US" dirty="0"/>
+              <a:t>in year 2020</a:t>
+            </a:r>
+          </a:p>
+          <a:p>
+            <a:r>
+              <a:rPr lang="en-US" b="1" dirty="0"/>
+              <a:t>Hotel Rooms </a:t>
+            </a:r>
+            <a:r>
+              <a:rPr lang="en-US" dirty="0"/>
+              <a:t>has most listings in Melbourne, </a:t>
+            </a:r>
+            <a:br>
+              <a:rPr lang="en-US" dirty="0"/>
+            </a:br>
+            <a:r>
+              <a:rPr lang="en-US" dirty="0"/>
+              <a:t>Port Philip and </a:t>
+            </a:r>
+            <a:r>
+              <a:rPr lang="en-US" dirty="0" err="1"/>
+              <a:t>Yarra</a:t>
+            </a:r>
+            <a:r>
+              <a:rPr lang="en-US" dirty="0"/>
+              <a:t> Ranges</a:t>
+            </a:r>
+          </a:p>
+        </p:txBody>
+      </p:sp>
+      <p:sp>
+        <p:nvSpPr>
+          <p:cNvPr id="6" name="Footer Placeholder 5">
+            <a:extLst>
+              <a:ext uri="{FF2B5EF4-FFF2-40B4-BE49-F238E27FC236}">
+                <a16:creationId xmlns:a16="http://schemas.microsoft.com/office/drawing/2014/main" id="{7AFC9C19-83AF-46CD-9C61-BF46A93DCDDF}"/>
+              </a:ext>
+            </a:extLst>
+          </p:cNvPr>
+          <p:cNvSpPr>
+            <a:spLocks noGrp="1"/>
+          </p:cNvSpPr>
+          <p:nvPr>
+            <p:ph type="ftr" sz="quarter" idx="17"/>
+          </p:nvPr>
+        </p:nvSpPr>
+        <p:spPr/>
+        <p:txBody>
+          <a:bodyPr/>
+          <a:lstStyle/>
+          <a:p>
+            <a:r>
+              <a:rPr lang="en-US"/>
+              <a:t>Add a Footer</a:t>
+            </a:r>
+            <a:endParaRPr lang="en-US" dirty="0"/>
+          </a:p>
+        </p:txBody>
+      </p:sp>
+      <p:sp>
+        <p:nvSpPr>
+          <p:cNvPr id="7" name="Slide Number Placeholder 6">
+            <a:extLst>
+              <a:ext uri="{FF2B5EF4-FFF2-40B4-BE49-F238E27FC236}">
+                <a16:creationId xmlns:a16="http://schemas.microsoft.com/office/drawing/2014/main" id="{7B0F959D-3783-4791-872C-A877B2B5D84F}"/>
+              </a:ext>
+            </a:extLst>
+          </p:cNvPr>
+          <p:cNvSpPr>
+            <a:spLocks noGrp="1"/>
+          </p:cNvSpPr>
+          <p:nvPr>
+            <p:ph type="sldNum" sz="quarter" idx="18"/>
+          </p:nvPr>
+        </p:nvSpPr>
+        <p:spPr/>
+        <p:txBody>
+          <a:bodyPr/>
+          <a:lstStyle/>
+          <a:p>
+            <a:fld id="{8C2E478F-E849-4A8C-AF1F-CBCC78A7CBFA}" type="slidenum">
+              <a:rPr lang="en-US" smtClean="0"/>
+              <a:pPr/>
+              <a:t>10</a:t>
+            </a:fld>
+            <a:endParaRPr lang="en-US" dirty="0"/>
+          </a:p>
+        </p:txBody>
+      </p:sp>
+    </p:spTree>
+    <p:extLst>
+      <p:ext uri="{BB962C8B-B14F-4D97-AF65-F5344CB8AC3E}">
+        <p14:creationId xmlns:p14="http://schemas.microsoft.com/office/powerpoint/2010/main" val="1851946157"/>
+      </p:ext>
+    </p:extLst>
+  </p:cSld>
+  <p:clrMapOvr>
+    <a:masterClrMapping/>
+  </p:clrMapOvr>
+</p:sld>
+</file>
+
+<file path=ppt/slides/slide11.xml><?xml version="1.0" encoding="utf-8"?>
+<p:sld xmlns:a="http://schemas.openxmlformats.org/drawingml/2006/main" xmlns:r="http://schemas.openxmlformats.org/officeDocument/2006/relationships" xmlns:p="http://schemas.openxmlformats.org/presentationml/2006/main">
+  <p:cSld>
+    <p:spTree>
+      <p:nvGrpSpPr>
+        <p:cNvPr id="1" name=""/>
+        <p:cNvGrpSpPr/>
+        <p:nvPr/>
+      </p:nvGrpSpPr>
+      <p:grpSpPr>
+        <a:xfrm>
+          <a:off x="0" y="0"/>
+          <a:ext cx="0" cy="0"/>
+          <a:chOff x="0" y="0"/>
+          <a:chExt cx="0" cy="0"/>
+        </a:xfrm>
+      </p:grpSpPr>
+      <p:sp>
+        <p:nvSpPr>
+          <p:cNvPr id="3" name="Content Placeholder 2">
+            <a:extLst>
+              <a:ext uri="{FF2B5EF4-FFF2-40B4-BE49-F238E27FC236}">
+                <a16:creationId xmlns:a16="http://schemas.microsoft.com/office/drawing/2014/main" id="{DF588524-9482-453A-A24B-AAE27BAA7343}"/>
+              </a:ext>
+            </a:extLst>
+          </p:cNvPr>
+          <p:cNvSpPr>
+            <a:spLocks noGrp="1"/>
+          </p:cNvSpPr>
+          <p:nvPr>
+            <p:ph sz="half" idx="2"/>
+          </p:nvPr>
+        </p:nvSpPr>
+        <p:spPr>
+          <a:xfrm>
+            <a:off x="595884" y="1799918"/>
+            <a:ext cx="3464717" cy="2710596"/>
+          </a:xfrm>
+        </p:spPr>
+        <p:txBody>
+          <a:bodyPr/>
+          <a:lstStyle/>
+          <a:p>
+            <a:r>
+              <a:rPr lang="en-US" dirty="0"/>
+              <a:t>Comparison of Airbnb listings between Urban and Regional areas</a:t>
+            </a:r>
+          </a:p>
+          <a:p>
+            <a:r>
+              <a:rPr lang="en-US" dirty="0"/>
+              <a:t>Slight increase in Airbnb listings in Regional areas</a:t>
+            </a:r>
+          </a:p>
+          <a:p>
+            <a:r>
+              <a:rPr lang="en-US" dirty="0"/>
+              <a:t>Decrease in Airbnb listings in Urban areas</a:t>
+            </a:r>
+          </a:p>
+          <a:p>
+            <a:endParaRPr lang="en-AU" dirty="0"/>
+          </a:p>
+        </p:txBody>
+      </p:sp>
+      <p:sp>
+        <p:nvSpPr>
+          <p:cNvPr id="5" name="Content Placeholder 4">
+            <a:extLst>
+              <a:ext uri="{FF2B5EF4-FFF2-40B4-BE49-F238E27FC236}">
+                <a16:creationId xmlns:a16="http://schemas.microsoft.com/office/drawing/2014/main" id="{EA53D317-6BB0-473F-B535-756CE0162457}"/>
+              </a:ext>
+            </a:extLst>
+          </p:cNvPr>
+          <p:cNvSpPr>
+            <a:spLocks noGrp="1"/>
+          </p:cNvSpPr>
+          <p:nvPr>
+            <p:ph sz="half" idx="14"/>
+          </p:nvPr>
+        </p:nvSpPr>
+        <p:spPr>
+          <a:xfrm>
+            <a:off x="7772170" y="5792789"/>
+            <a:ext cx="3585639" cy="919781"/>
+          </a:xfrm>
+        </p:spPr>
+        <p:txBody>
+          <a:bodyPr>
+            <a:normAutofit/>
+          </a:bodyPr>
+          <a:lstStyle/>
+          <a:p>
+            <a:r>
+              <a:rPr lang="en-US" dirty="0"/>
+              <a:t>Examples for City of Melbourne and </a:t>
+            </a:r>
+            <a:r>
+              <a:rPr lang="en-US" dirty="0" err="1"/>
+              <a:t>Yarra</a:t>
+            </a:r>
+            <a:r>
+              <a:rPr lang="en-US" dirty="0"/>
+              <a:t> Ranges</a:t>
+            </a:r>
+          </a:p>
+        </p:txBody>
+      </p:sp>
+      <p:sp>
+        <p:nvSpPr>
+          <p:cNvPr id="7" name="Title 6">
+            <a:extLst>
+              <a:ext uri="{FF2B5EF4-FFF2-40B4-BE49-F238E27FC236}">
+                <a16:creationId xmlns:a16="http://schemas.microsoft.com/office/drawing/2014/main" id="{3C0958DA-E006-45BA-B257-20A3971AC6AB}"/>
+              </a:ext>
+            </a:extLst>
+          </p:cNvPr>
+          <p:cNvSpPr>
+            <a:spLocks noGrp="1"/>
+          </p:cNvSpPr>
+          <p:nvPr>
+            <p:ph type="title"/>
+          </p:nvPr>
+        </p:nvSpPr>
+        <p:spPr/>
+        <p:txBody>
+          <a:bodyPr/>
+          <a:lstStyle/>
+          <a:p>
+            <a:r>
+              <a:rPr lang="en-US" dirty="0"/>
+              <a:t>Regional vs Urban City Listings</a:t>
+            </a:r>
+            <a:endParaRPr lang="en-AU" dirty="0"/>
+          </a:p>
+        </p:txBody>
+      </p:sp>
+      <p:sp>
+        <p:nvSpPr>
+          <p:cNvPr id="8" name="Footer Placeholder 7">
+            <a:extLst>
+              <a:ext uri="{FF2B5EF4-FFF2-40B4-BE49-F238E27FC236}">
+                <a16:creationId xmlns:a16="http://schemas.microsoft.com/office/drawing/2014/main" id="{ADD05F8C-3C61-448B-A30A-F8E7E0C82B5F}"/>
+              </a:ext>
+            </a:extLst>
+          </p:cNvPr>
+          <p:cNvSpPr>
+            <a:spLocks noGrp="1"/>
+          </p:cNvSpPr>
+          <p:nvPr>
+            <p:ph type="ftr" sz="quarter" idx="16"/>
+          </p:nvPr>
+        </p:nvSpPr>
+        <p:spPr/>
+        <p:txBody>
+          <a:bodyPr/>
+          <a:lstStyle/>
+          <a:p>
+            <a:r>
+              <a:rPr lang="en-US"/>
+              <a:t>Add a Footer</a:t>
+            </a:r>
+            <a:endParaRPr lang="en-US" dirty="0"/>
+          </a:p>
+        </p:txBody>
+      </p:sp>
+      <p:sp>
+        <p:nvSpPr>
+          <p:cNvPr id="9" name="Slide Number Placeholder 8">
+            <a:extLst>
+              <a:ext uri="{FF2B5EF4-FFF2-40B4-BE49-F238E27FC236}">
+                <a16:creationId xmlns:a16="http://schemas.microsoft.com/office/drawing/2014/main" id="{638540F9-3CD8-49AC-A6AF-0CB5CC2BD22F}"/>
+              </a:ext>
+            </a:extLst>
+          </p:cNvPr>
+          <p:cNvSpPr>
+            <a:spLocks noGrp="1"/>
+          </p:cNvSpPr>
+          <p:nvPr>
+            <p:ph type="sldNum" sz="quarter" idx="17"/>
+          </p:nvPr>
+        </p:nvSpPr>
+        <p:spPr/>
+        <p:txBody>
+          <a:bodyPr/>
+          <a:lstStyle/>
+          <a:p>
+            <a:fld id="{8C2E478F-E849-4A8C-AF1F-CBCC78A7CBFA}" type="slidenum">
+              <a:rPr lang="en-US" smtClean="0"/>
+              <a:pPr/>
+              <a:t>11</a:t>
+            </a:fld>
+            <a:endParaRPr lang="en-US" dirty="0"/>
+          </a:p>
+        </p:txBody>
+      </p:sp>
+      <p:pic>
+        <p:nvPicPr>
+          <p:cNvPr id="11" name="Picture Placeholder 10">
+            <a:extLst>
+              <a:ext uri="{FF2B5EF4-FFF2-40B4-BE49-F238E27FC236}">
+                <a16:creationId xmlns:a16="http://schemas.microsoft.com/office/drawing/2014/main" id="{EC41DBD4-5771-4791-AD2B-E7F3135BB984}"/>
+              </a:ext>
+            </a:extLst>
+          </p:cNvPr>
+          <p:cNvPicPr>
+            <a:picLocks noGrp="1" noChangeAspect="1"/>
+          </p:cNvPicPr>
+          <p:nvPr>
+            <p:ph type="pic" sz="quarter" idx="15"/>
+          </p:nvPr>
+        </p:nvPicPr>
+        <p:blipFill>
+          <a:blip r:embed="rId2">
+            <a:extLst>
+              <a:ext uri="{28A0092B-C50C-407E-A947-70E740481C1C}">
+                <a14:useLocalDpi xmlns:a14="http://schemas.microsoft.com/office/drawing/2010/main" val="0"/>
+              </a:ext>
+            </a:extLst>
+          </a:blip>
+          <a:srcRect t="2913" b="2913"/>
+          <a:stretch>
+            <a:fillRect/>
+          </a:stretch>
+        </p:blipFill>
+        <p:spPr>
+          <a:xfrm>
+            <a:off x="4710684" y="3082193"/>
+            <a:ext cx="5756562" cy="2710596"/>
+          </a:xfrm>
+          <a:prstGeom prst="rect">
+            <a:avLst/>
+          </a:prstGeom>
+        </p:spPr>
+      </p:pic>
+      <p:pic>
+        <p:nvPicPr>
+          <p:cNvPr id="12" name="Picture Placeholder 10">
+            <a:extLst>
+              <a:ext uri="{FF2B5EF4-FFF2-40B4-BE49-F238E27FC236}">
+                <a16:creationId xmlns:a16="http://schemas.microsoft.com/office/drawing/2014/main" id="{817955CE-4011-4C57-B4E7-D0AEC2F510A7}"/>
+              </a:ext>
+            </a:extLst>
+          </p:cNvPr>
+          <p:cNvPicPr>
+            <a:picLocks noChangeAspect="1"/>
+          </p:cNvPicPr>
+          <p:nvPr/>
+        </p:nvPicPr>
+        <p:blipFill>
+          <a:blip r:embed="rId2">
+            <a:extLst>
+              <a:ext uri="{28A0092B-C50C-407E-A947-70E740481C1C}">
+                <a14:useLocalDpi xmlns:a14="http://schemas.microsoft.com/office/drawing/2010/main" val="0"/>
+              </a:ext>
+            </a:extLst>
+          </a:blip>
+          <a:srcRect t="2913" b="2913"/>
+          <a:stretch>
+            <a:fillRect/>
+          </a:stretch>
+        </p:blipFill>
+        <p:spPr>
+          <a:xfrm>
+            <a:off x="4710684" y="204623"/>
+            <a:ext cx="5756562" cy="2710596"/>
+          </a:xfrm>
+          <a:prstGeom prst="rect">
+            <a:avLst/>
+          </a:prstGeom>
+          <a:solidFill>
+            <a:schemeClr val="bg1"/>
+          </a:solidFill>
+        </p:spPr>
+      </p:pic>
+    </p:spTree>
+    <p:extLst>
+      <p:ext uri="{BB962C8B-B14F-4D97-AF65-F5344CB8AC3E}">
+        <p14:creationId xmlns:p14="http://schemas.microsoft.com/office/powerpoint/2010/main" val="3907399648"/>
+      </p:ext>
+    </p:extLst>
+  </p:cSld>
+  <p:clrMapOvr>
+    <a:masterClrMapping/>
+  </p:clrMapOvr>
+</p:sld>
+</file>
+
+<file path=ppt/slides/slide12.xml><?xml version="1.0" encoding="utf-8"?>
+<p:sld xmlns:a="http://schemas.openxmlformats.org/drawingml/2006/main" xmlns:r="http://schemas.openxmlformats.org/officeDocument/2006/relationships" xmlns:p="http://schemas.openxmlformats.org/presentationml/2006/main">
+  <p:cSld>
+    <p:spTree>
+      <p:nvGrpSpPr>
+        <p:cNvPr id="1" name=""/>
+        <p:cNvGrpSpPr/>
+        <p:nvPr/>
+      </p:nvGrpSpPr>
+      <p:grpSpPr>
+        <a:xfrm>
+          <a:off x="0" y="0"/>
+          <a:ext cx="0" cy="0"/>
+          <a:chOff x="0" y="0"/>
+          <a:chExt cx="0" cy="0"/>
+        </a:xfrm>
+      </p:grpSpPr>
+      <p:sp>
+        <p:nvSpPr>
+          <p:cNvPr id="2" name="Content Placeholder 1">
+            <a:extLst>
+              <a:ext uri="{FF2B5EF4-FFF2-40B4-BE49-F238E27FC236}">
+                <a16:creationId xmlns:a16="http://schemas.microsoft.com/office/drawing/2014/main" id="{DECF1F70-85B7-4AFA-B802-471BD4826D50}"/>
+              </a:ext>
+            </a:extLst>
+          </p:cNvPr>
+          <p:cNvSpPr>
+            <a:spLocks noGrp="1"/>
+          </p:cNvSpPr>
+          <p:nvPr>
+            <p:ph idx="1"/>
+          </p:nvPr>
+        </p:nvSpPr>
+        <p:spPr>
+          <a:xfrm>
+            <a:off x="176463" y="1728116"/>
+            <a:ext cx="5260850" cy="4201109"/>
+          </a:xfrm>
+        </p:spPr>
+        <p:txBody>
+          <a:bodyPr>
+            <a:normAutofit/>
+          </a:bodyPr>
+          <a:lstStyle/>
+          <a:p>
+            <a:r>
+              <a:rPr lang="en-US" dirty="0"/>
+              <a:t>Median prices for all Airbnb listings have slightly increased or remained the same</a:t>
+            </a:r>
+          </a:p>
+          <a:p>
+            <a:r>
+              <a:rPr lang="en-US" dirty="0"/>
+              <a:t>Entire Home prices in </a:t>
+            </a:r>
+            <a:r>
+              <a:rPr lang="en-US" dirty="0" err="1"/>
+              <a:t>Yarra</a:t>
+            </a:r>
+            <a:r>
+              <a:rPr lang="en-US" dirty="0"/>
+              <a:t> Ranges and Bayside have increased in 2020.</a:t>
+            </a:r>
+          </a:p>
+          <a:p>
+            <a:endParaRPr lang="en-AU" dirty="0"/>
+          </a:p>
+        </p:txBody>
+      </p:sp>
+      <p:sp>
+        <p:nvSpPr>
+          <p:cNvPr id="3" name="Title 2">
+            <a:extLst>
+              <a:ext uri="{FF2B5EF4-FFF2-40B4-BE49-F238E27FC236}">
+                <a16:creationId xmlns:a16="http://schemas.microsoft.com/office/drawing/2014/main" id="{7816781F-2604-4BDC-86D6-F50279B2F78C}"/>
+              </a:ext>
+            </a:extLst>
+          </p:cNvPr>
+          <p:cNvSpPr>
+            <a:spLocks noGrp="1"/>
+          </p:cNvSpPr>
+          <p:nvPr>
+            <p:ph type="title"/>
+          </p:nvPr>
+        </p:nvSpPr>
+        <p:spPr>
+          <a:xfrm>
+            <a:off x="0" y="0"/>
+            <a:ext cx="11002962" cy="1189038"/>
+          </a:xfrm>
+        </p:spPr>
+        <p:txBody>
+          <a:bodyPr/>
+          <a:lstStyle/>
+          <a:p>
+            <a:pPr algn="l"/>
+            <a:r>
+              <a:rPr lang="en-AU" dirty="0"/>
+              <a:t>Airbnb Listings Price Comparison</a:t>
+            </a:r>
+          </a:p>
+        </p:txBody>
+      </p:sp>
+      <p:sp>
+        <p:nvSpPr>
+          <p:cNvPr id="4" name="Footer Placeholder 3">
+            <a:extLst>
+              <a:ext uri="{FF2B5EF4-FFF2-40B4-BE49-F238E27FC236}">
+                <a16:creationId xmlns:a16="http://schemas.microsoft.com/office/drawing/2014/main" id="{71726940-3062-481C-8E2B-71604DB3617F}"/>
+              </a:ext>
+            </a:extLst>
+          </p:cNvPr>
+          <p:cNvSpPr>
+            <a:spLocks noGrp="1"/>
+          </p:cNvSpPr>
+          <p:nvPr>
+            <p:ph type="ftr" sz="quarter" idx="10"/>
+          </p:nvPr>
+        </p:nvSpPr>
+        <p:spPr/>
+        <p:txBody>
+          <a:bodyPr/>
+          <a:lstStyle/>
+          <a:p>
+            <a:r>
+              <a:rPr lang="en-US"/>
+              <a:t>Add a Footer</a:t>
+            </a:r>
+            <a:endParaRPr lang="en-US" dirty="0"/>
+          </a:p>
+        </p:txBody>
+      </p:sp>
+      <p:sp>
+        <p:nvSpPr>
+          <p:cNvPr id="5" name="Slide Number Placeholder 4">
+            <a:extLst>
+              <a:ext uri="{FF2B5EF4-FFF2-40B4-BE49-F238E27FC236}">
+                <a16:creationId xmlns:a16="http://schemas.microsoft.com/office/drawing/2014/main" id="{F7C46F20-0695-4885-AF35-F236783856CA}"/>
+              </a:ext>
+            </a:extLst>
+          </p:cNvPr>
+          <p:cNvSpPr>
+            <a:spLocks noGrp="1"/>
+          </p:cNvSpPr>
+          <p:nvPr>
+            <p:ph type="sldNum" sz="quarter" idx="11"/>
+          </p:nvPr>
+        </p:nvSpPr>
+        <p:spPr/>
+        <p:txBody>
+          <a:bodyPr/>
+          <a:lstStyle/>
+          <a:p>
+            <a:fld id="{8C2E478F-E849-4A8C-AF1F-CBCC78A7CBFA}" type="slidenum">
+              <a:rPr lang="en-US" smtClean="0"/>
+              <a:pPr/>
+              <a:t>12</a:t>
+            </a:fld>
+            <a:endParaRPr lang="en-US" dirty="0"/>
+          </a:p>
+        </p:txBody>
+      </p:sp>
+      <p:pic>
+        <p:nvPicPr>
+          <p:cNvPr id="6" name="Picture 5">
+            <a:extLst>
+              <a:ext uri="{FF2B5EF4-FFF2-40B4-BE49-F238E27FC236}">
+                <a16:creationId xmlns:a16="http://schemas.microsoft.com/office/drawing/2014/main" id="{D328CD9C-A288-4DED-8774-3F6913FEC1BD}"/>
+              </a:ext>
+            </a:extLst>
+          </p:cNvPr>
+          <p:cNvPicPr>
+            <a:picLocks noChangeAspect="1"/>
+          </p:cNvPicPr>
+          <p:nvPr/>
+        </p:nvPicPr>
+        <p:blipFill>
+          <a:blip r:embed="rId2">
+            <a:extLst>
+              <a:ext uri="{28A0092B-C50C-407E-A947-70E740481C1C}">
+                <a14:useLocalDpi xmlns:a14="http://schemas.microsoft.com/office/drawing/2010/main" val="0"/>
+              </a:ext>
+            </a:extLst>
+          </a:blip>
+          <a:stretch>
+            <a:fillRect/>
+          </a:stretch>
+        </p:blipFill>
+        <p:spPr>
+          <a:xfrm>
+            <a:off x="5645641" y="814137"/>
+            <a:ext cx="6450106" cy="5486399"/>
+          </a:xfrm>
+          <a:prstGeom prst="rect">
+            <a:avLst/>
+          </a:prstGeom>
+        </p:spPr>
+      </p:pic>
+    </p:spTree>
+    <p:extLst>
+      <p:ext uri="{BB962C8B-B14F-4D97-AF65-F5344CB8AC3E}">
+        <p14:creationId xmlns:p14="http://schemas.microsoft.com/office/powerpoint/2010/main" val="3561463317"/>
+      </p:ext>
+    </p:extLst>
+  </p:cSld>
+  <p:clrMapOvr>
+    <a:masterClrMapping/>
+  </p:clrMapOvr>
+</p:sld>
+</file>
+
+<file path=ppt/slides/slide13.xml><?xml version="1.0" encoding="utf-8"?>
+<p:sld xmlns:a="http://schemas.openxmlformats.org/drawingml/2006/main" xmlns:r="http://schemas.openxmlformats.org/officeDocument/2006/relationships" xmlns:p="http://schemas.openxmlformats.org/presentationml/2006/main">
+  <p:cSld>
+    <p:spTree>
+      <p:nvGrpSpPr>
+        <p:cNvPr id="1" name=""/>
+        <p:cNvGrpSpPr/>
+        <p:nvPr/>
+      </p:nvGrpSpPr>
+      <p:grpSpPr>
+        <a:xfrm>
+          <a:off x="0" y="0"/>
+          <a:ext cx="0" cy="0"/>
+          <a:chOff x="0" y="0"/>
+          <a:chExt cx="0" cy="0"/>
+        </a:xfrm>
+      </p:grpSpPr>
+      <p:sp>
+        <p:nvSpPr>
+          <p:cNvPr id="3" name="Title 2">
+            <a:extLst>
+              <a:ext uri="{FF2B5EF4-FFF2-40B4-BE49-F238E27FC236}">
+                <a16:creationId xmlns:a16="http://schemas.microsoft.com/office/drawing/2014/main" id="{C06C2A79-1873-4027-ACE0-E6E3FCD2B2AC}"/>
+              </a:ext>
+            </a:extLst>
+          </p:cNvPr>
+          <p:cNvSpPr>
+            <a:spLocks noGrp="1"/>
+          </p:cNvSpPr>
+          <p:nvPr>
+            <p:ph type="title"/>
+          </p:nvPr>
+        </p:nvSpPr>
+        <p:spPr>
+          <a:xfrm>
+            <a:off x="65314" y="43538"/>
+            <a:ext cx="3872204" cy="2248678"/>
+          </a:xfrm>
+        </p:spPr>
+        <p:txBody>
+          <a:bodyPr>
+            <a:normAutofit/>
+          </a:bodyPr>
+          <a:lstStyle/>
+          <a:p>
+            <a:pPr algn="l"/>
+            <a:r>
+              <a:rPr lang="en-AU" dirty="0"/>
+              <a:t>Airbnb Listings Price Comparison</a:t>
+            </a:r>
+          </a:p>
+        </p:txBody>
+      </p:sp>
+      <p:sp>
+        <p:nvSpPr>
+          <p:cNvPr id="4" name="Footer Placeholder 3">
+            <a:extLst>
+              <a:ext uri="{FF2B5EF4-FFF2-40B4-BE49-F238E27FC236}">
+                <a16:creationId xmlns:a16="http://schemas.microsoft.com/office/drawing/2014/main" id="{039DA1F9-741F-4F99-80E3-4F7C03898624}"/>
+              </a:ext>
+            </a:extLst>
+          </p:cNvPr>
+          <p:cNvSpPr>
+            <a:spLocks noGrp="1"/>
+          </p:cNvSpPr>
+          <p:nvPr>
+            <p:ph type="ftr" sz="quarter" idx="10"/>
+          </p:nvPr>
+        </p:nvSpPr>
+        <p:spPr/>
+        <p:txBody>
+          <a:bodyPr/>
+          <a:lstStyle/>
+          <a:p>
+            <a:r>
+              <a:rPr lang="en-US"/>
+              <a:t>Add a Footer</a:t>
+            </a:r>
+            <a:endParaRPr lang="en-US" dirty="0"/>
+          </a:p>
+        </p:txBody>
+      </p:sp>
+      <p:sp>
+        <p:nvSpPr>
+          <p:cNvPr id="5" name="Slide Number Placeholder 4">
+            <a:extLst>
+              <a:ext uri="{FF2B5EF4-FFF2-40B4-BE49-F238E27FC236}">
+                <a16:creationId xmlns:a16="http://schemas.microsoft.com/office/drawing/2014/main" id="{C7953CAA-1A08-4B79-ACBD-6E83AEF5B627}"/>
+              </a:ext>
+            </a:extLst>
+          </p:cNvPr>
+          <p:cNvSpPr>
+            <a:spLocks noGrp="1"/>
+          </p:cNvSpPr>
+          <p:nvPr>
+            <p:ph type="sldNum" sz="quarter" idx="11"/>
+          </p:nvPr>
+        </p:nvSpPr>
+        <p:spPr/>
+        <p:txBody>
+          <a:bodyPr/>
+          <a:lstStyle/>
+          <a:p>
+            <a:fld id="{8C2E478F-E849-4A8C-AF1F-CBCC78A7CBFA}" type="slidenum">
+              <a:rPr lang="en-US" smtClean="0"/>
+              <a:pPr/>
+              <a:t>13</a:t>
+            </a:fld>
+            <a:endParaRPr lang="en-US" dirty="0"/>
+          </a:p>
+        </p:txBody>
+      </p:sp>
+      <p:pic>
+        <p:nvPicPr>
+          <p:cNvPr id="7" name="Picture 6" descr="Chart, box and whisker chart&#10;&#10;Description automatically generated">
+            <a:extLst>
+              <a:ext uri="{FF2B5EF4-FFF2-40B4-BE49-F238E27FC236}">
+                <a16:creationId xmlns:a16="http://schemas.microsoft.com/office/drawing/2014/main" id="{D8750431-D2B5-4F24-A120-F78B2E2145B2}"/>
+              </a:ext>
+            </a:extLst>
+          </p:cNvPr>
+          <p:cNvPicPr>
+            <a:picLocks noChangeAspect="1"/>
+          </p:cNvPicPr>
+          <p:nvPr/>
+        </p:nvPicPr>
+        <p:blipFill>
+          <a:blip r:embed="rId2"/>
+          <a:stretch>
+            <a:fillRect/>
+          </a:stretch>
+        </p:blipFill>
+        <p:spPr>
+          <a:xfrm>
+            <a:off x="4154177" y="47422"/>
+            <a:ext cx="6654281" cy="6654281"/>
+          </a:xfrm>
+          <a:prstGeom prst="rect">
+            <a:avLst/>
+          </a:prstGeom>
+        </p:spPr>
+      </p:pic>
+    </p:spTree>
+    <p:extLst>
+      <p:ext uri="{BB962C8B-B14F-4D97-AF65-F5344CB8AC3E}">
+        <p14:creationId xmlns:p14="http://schemas.microsoft.com/office/powerpoint/2010/main" val="2854924587"/>
+      </p:ext>
+    </p:extLst>
+  </p:cSld>
+  <p:clrMapOvr>
+    <a:masterClrMapping/>
+  </p:clrMapOvr>
+</p:sld>
+</file>
+
+<file path=ppt/slides/slide14.xml><?xml version="1.0" encoding="utf-8"?>
+<p:sld xmlns:a="http://schemas.openxmlformats.org/drawingml/2006/main" xmlns:r="http://schemas.openxmlformats.org/officeDocument/2006/relationships" xmlns:p="http://schemas.openxmlformats.org/presentationml/2006/main">
+  <p:cSld>
+    <p:spTree>
+      <p:nvGrpSpPr>
+        <p:cNvPr id="1" name=""/>
+        <p:cNvGrpSpPr/>
+        <p:nvPr/>
+      </p:nvGrpSpPr>
+      <p:grpSpPr>
+        <a:xfrm>
+          <a:off x="0" y="0"/>
+          <a:ext cx="0" cy="0"/>
+          <a:chOff x="0" y="0"/>
+          <a:chExt cx="0" cy="0"/>
+        </a:xfrm>
+      </p:grpSpPr>
+      <p:pic>
+        <p:nvPicPr>
+          <p:cNvPr id="9" name="Content Placeholder 8" descr="Chart, scatter chart&#10;&#10;Description automatically generated">
+            <a:extLst>
+              <a:ext uri="{FF2B5EF4-FFF2-40B4-BE49-F238E27FC236}">
+                <a16:creationId xmlns:a16="http://schemas.microsoft.com/office/drawing/2014/main" id="{0F3E7208-1D4F-4F40-99FA-BC25FE94F637}"/>
+              </a:ext>
+            </a:extLst>
+          </p:cNvPr>
+          <p:cNvPicPr>
+            <a:picLocks noGrp="1" noChangeAspect="1"/>
+          </p:cNvPicPr>
+          <p:nvPr>
+            <p:ph sz="quarter" idx="16"/>
+          </p:nvPr>
+        </p:nvPicPr>
+        <p:blipFill>
+          <a:blip r:embed="rId2"/>
+          <a:stretch>
+            <a:fillRect/>
+          </a:stretch>
+        </p:blipFill>
+        <p:spPr>
+          <a:xfrm>
+            <a:off x="6383615" y="40951"/>
+            <a:ext cx="5082073" cy="3388049"/>
+          </a:xfrm>
+        </p:spPr>
+      </p:pic>
+      <p:sp>
+        <p:nvSpPr>
+          <p:cNvPr id="3" name="Title 2">
+            <a:extLst>
+              <a:ext uri="{FF2B5EF4-FFF2-40B4-BE49-F238E27FC236}">
+                <a16:creationId xmlns:a16="http://schemas.microsoft.com/office/drawing/2014/main" id="{2BB2154A-120A-42E6-8057-549C5A48E437}"/>
+              </a:ext>
+            </a:extLst>
+          </p:cNvPr>
+          <p:cNvSpPr>
+            <a:spLocks noGrp="1"/>
+          </p:cNvSpPr>
+          <p:nvPr>
+            <p:ph type="title"/>
+          </p:nvPr>
+        </p:nvSpPr>
+        <p:spPr/>
+        <p:txBody>
+          <a:bodyPr/>
+          <a:lstStyle/>
+          <a:p>
+            <a:r>
+              <a:rPr lang="en-AU" dirty="0"/>
+              <a:t>Review Score vs Price</a:t>
+            </a:r>
+          </a:p>
+        </p:txBody>
+      </p:sp>
+      <p:pic>
+        <p:nvPicPr>
+          <p:cNvPr id="11" name="Content Placeholder 10" descr="Chart&#10;&#10;Description automatically generated">
+            <a:extLst>
+              <a:ext uri="{FF2B5EF4-FFF2-40B4-BE49-F238E27FC236}">
+                <a16:creationId xmlns:a16="http://schemas.microsoft.com/office/drawing/2014/main" id="{C01110A4-7D43-4B95-8AD3-61ACD98DA9B8}"/>
+              </a:ext>
+            </a:extLst>
+          </p:cNvPr>
+          <p:cNvPicPr>
+            <a:picLocks noGrp="1" noChangeAspect="1"/>
+          </p:cNvPicPr>
+          <p:nvPr>
+            <p:ph idx="1"/>
+          </p:nvPr>
+        </p:nvPicPr>
+        <p:blipFill>
+          <a:blip r:embed="rId3"/>
+          <a:stretch>
+            <a:fillRect/>
+          </a:stretch>
+        </p:blipFill>
+        <p:spPr>
+          <a:xfrm>
+            <a:off x="6383616" y="3469952"/>
+            <a:ext cx="5082073" cy="3388048"/>
+          </a:xfrm>
+        </p:spPr>
+      </p:pic>
+      <p:sp>
+        <p:nvSpPr>
+          <p:cNvPr id="6" name="Footer Placeholder 5">
+            <a:extLst>
+              <a:ext uri="{FF2B5EF4-FFF2-40B4-BE49-F238E27FC236}">
+                <a16:creationId xmlns:a16="http://schemas.microsoft.com/office/drawing/2014/main" id="{08C26AC5-57DD-4763-9B8F-799AF2B0DAC2}"/>
+              </a:ext>
+            </a:extLst>
+          </p:cNvPr>
+          <p:cNvSpPr>
+            <a:spLocks noGrp="1"/>
+          </p:cNvSpPr>
+          <p:nvPr>
+            <p:ph type="ftr" sz="quarter" idx="17"/>
+          </p:nvPr>
+        </p:nvSpPr>
+        <p:spPr/>
+        <p:txBody>
+          <a:bodyPr/>
+          <a:lstStyle/>
+          <a:p>
+            <a:r>
+              <a:rPr lang="en-US"/>
+              <a:t>Add a Footer</a:t>
+            </a:r>
+            <a:endParaRPr lang="en-US" dirty="0"/>
+          </a:p>
+        </p:txBody>
+      </p:sp>
+      <p:sp>
+        <p:nvSpPr>
+          <p:cNvPr id="7" name="Slide Number Placeholder 6">
+            <a:extLst>
+              <a:ext uri="{FF2B5EF4-FFF2-40B4-BE49-F238E27FC236}">
+                <a16:creationId xmlns:a16="http://schemas.microsoft.com/office/drawing/2014/main" id="{FD6F576E-69A1-4BE4-8D40-F2EAB0AB4CF4}"/>
+              </a:ext>
+            </a:extLst>
+          </p:cNvPr>
+          <p:cNvSpPr>
+            <a:spLocks noGrp="1"/>
+          </p:cNvSpPr>
+          <p:nvPr>
+            <p:ph type="sldNum" sz="quarter" idx="18"/>
+          </p:nvPr>
+        </p:nvSpPr>
+        <p:spPr/>
+        <p:txBody>
+          <a:bodyPr/>
+          <a:lstStyle/>
+          <a:p>
+            <a:fld id="{8C2E478F-E849-4A8C-AF1F-CBCC78A7CBFA}" type="slidenum">
+              <a:rPr lang="en-US" smtClean="0"/>
+              <a:pPr/>
+              <a:t>14</a:t>
+            </a:fld>
+            <a:endParaRPr lang="en-US" dirty="0"/>
+          </a:p>
+        </p:txBody>
+      </p:sp>
+      <p:sp>
+        <p:nvSpPr>
+          <p:cNvPr id="12" name="Content Placeholder 3">
+            <a:extLst>
+              <a:ext uri="{FF2B5EF4-FFF2-40B4-BE49-F238E27FC236}">
+                <a16:creationId xmlns:a16="http://schemas.microsoft.com/office/drawing/2014/main" id="{23ECED43-DE7B-45CC-AB43-2B304C41F014}"/>
+              </a:ext>
+            </a:extLst>
+          </p:cNvPr>
+          <p:cNvSpPr txBox="1">
+            <a:spLocks/>
+          </p:cNvSpPr>
+          <p:nvPr/>
+        </p:nvSpPr>
+        <p:spPr>
+          <a:xfrm>
+            <a:off x="611804" y="2032939"/>
+            <a:ext cx="4226024" cy="3857329"/>
+          </a:xfrm>
+          <a:prstGeom prst="rect">
+            <a:avLst/>
+          </a:prstGeom>
+        </p:spPr>
+        <p:txBody>
+          <a:bodyPr vert="horz" lIns="0" tIns="45720" rIns="0" bIns="45720" rtlCol="0">
+            <a:normAutofit/>
+          </a:bodyPr>
+          <a:lstStyle>
+            <a:lvl1pPr marL="228600" indent="-228600" algn="l" defTabSz="914400" rtl="0" eaLnBrk="1" latinLnBrk="0" hangingPunct="1">
+              <a:lnSpc>
+                <a:spcPct val="150000"/>
+              </a:lnSpc>
+              <a:spcBef>
+                <a:spcPts val="1000"/>
+              </a:spcBef>
+              <a:buFont typeface="Arial" panose="020B0604020202020204" pitchFamily="34" charset="0"/>
+              <a:buChar char="•"/>
+              <a:defRPr sz="1600" kern="1200">
+                <a:solidFill>
+                  <a:schemeClr val="bg1"/>
+                </a:solidFill>
+                <a:latin typeface="+mn-lt"/>
+                <a:ea typeface="+mn-ea"/>
+                <a:cs typeface="+mn-cs"/>
+              </a:defRPr>
+            </a:lvl1pPr>
+            <a:lvl2pPr marL="685800" indent="-228600" algn="l" defTabSz="914400" rtl="0" eaLnBrk="1" latinLnBrk="0" hangingPunct="1">
+              <a:lnSpc>
+                <a:spcPct val="150000"/>
+              </a:lnSpc>
+              <a:spcBef>
+                <a:spcPts val="500"/>
+              </a:spcBef>
+              <a:buFont typeface="Arial" panose="020B0604020202020204" pitchFamily="34" charset="0"/>
+              <a:buChar char="•"/>
+              <a:defRPr sz="1600" kern="1200">
+                <a:solidFill>
+                  <a:schemeClr val="bg1"/>
+                </a:solidFill>
+                <a:latin typeface="+mn-lt"/>
+                <a:ea typeface="+mn-ea"/>
+                <a:cs typeface="+mn-cs"/>
+              </a:defRPr>
+            </a:lvl2pPr>
+            <a:lvl3pPr marL="1143000" indent="-228600" algn="l" defTabSz="914400" rtl="0" eaLnBrk="1" latinLnBrk="0" hangingPunct="1">
+              <a:lnSpc>
+                <a:spcPct val="150000"/>
+              </a:lnSpc>
+              <a:spcBef>
+                <a:spcPts val="500"/>
+              </a:spcBef>
+              <a:buFont typeface="Arial" panose="020B0604020202020204" pitchFamily="34" charset="0"/>
+              <a:buChar char="•"/>
+              <a:defRPr sz="1400" kern="1200">
+                <a:solidFill>
+                  <a:schemeClr val="bg1"/>
+                </a:solidFill>
+                <a:latin typeface="+mn-lt"/>
+                <a:ea typeface="+mn-ea"/>
+                <a:cs typeface="+mn-cs"/>
+              </a:defRPr>
+            </a:lvl3pPr>
+            <a:lvl4pPr marL="1600200" indent="-228600" algn="l" defTabSz="914400" rtl="0" eaLnBrk="1" latinLnBrk="0" hangingPunct="1">
+              <a:lnSpc>
+                <a:spcPct val="150000"/>
+              </a:lnSpc>
+              <a:spcBef>
+                <a:spcPts val="500"/>
+              </a:spcBef>
+              <a:buFont typeface="Arial" panose="020B0604020202020204" pitchFamily="34" charset="0"/>
+              <a:buChar char="•"/>
+              <a:defRPr sz="1200" kern="1200">
+                <a:solidFill>
+                  <a:schemeClr val="bg1"/>
+                </a:solidFill>
+                <a:latin typeface="+mn-lt"/>
+                <a:ea typeface="+mn-ea"/>
+                <a:cs typeface="+mn-cs"/>
+              </a:defRPr>
+            </a:lvl4pPr>
+            <a:lvl5pPr marL="2057400" indent="-228600" algn="l" defTabSz="914400" rtl="0" eaLnBrk="1" latinLnBrk="0" hangingPunct="1">
+              <a:lnSpc>
+                <a:spcPct val="150000"/>
+              </a:lnSpc>
+              <a:spcBef>
+                <a:spcPts val="500"/>
+              </a:spcBef>
+              <a:buFont typeface="Arial" panose="020B0604020202020204" pitchFamily="34" charset="0"/>
+              <a:buChar char="•"/>
+              <a:defRPr sz="1200" kern="1200">
+                <a:solidFill>
+                  <a:schemeClr val="bg1"/>
+                </a:solidFill>
+                <a:latin typeface="+mn-lt"/>
+                <a:ea typeface="+mn-ea"/>
+                <a:cs typeface="+mn-cs"/>
+              </a:defRPr>
+            </a:lvl5pPr>
+            <a:lvl6pPr marL="2514600" indent="-228600" algn="l" defTabSz="914400" rtl="0" eaLnBrk="1" latinLnBrk="0" hangingPunct="1">
+              <a:lnSpc>
+                <a:spcPct val="90000"/>
+              </a:lnSpc>
+              <a:spcBef>
+                <a:spcPts val="500"/>
+              </a:spcBef>
+              <a:buFont typeface="Arial" panose="020B0604020202020204" pitchFamily="34" charset="0"/>
+              <a:buChar char="•"/>
+              <a:defRPr sz="1800" kern="1200">
+                <a:solidFill>
+                  <a:schemeClr val="tx1"/>
+                </a:solidFill>
+                <a:latin typeface="+mn-lt"/>
+                <a:ea typeface="+mn-ea"/>
+                <a:cs typeface="+mn-cs"/>
+              </a:defRPr>
+            </a:lvl6pPr>
+            <a:lvl7pPr marL="2971800" indent="-228600" algn="l" defTabSz="914400" rtl="0" eaLnBrk="1" latinLnBrk="0" hangingPunct="1">
+              <a:lnSpc>
+                <a:spcPct val="90000"/>
+              </a:lnSpc>
+              <a:spcBef>
+                <a:spcPts val="500"/>
+              </a:spcBef>
+              <a:buFont typeface="Arial" panose="020B0604020202020204" pitchFamily="34" charset="0"/>
+              <a:buChar char="•"/>
+              <a:defRPr sz="1800" kern="1200">
+                <a:solidFill>
+                  <a:schemeClr val="tx1"/>
+                </a:solidFill>
+                <a:latin typeface="+mn-lt"/>
+                <a:ea typeface="+mn-ea"/>
+                <a:cs typeface="+mn-cs"/>
+              </a:defRPr>
+            </a:lvl7pPr>
+            <a:lvl8pPr marL="3429000" indent="-228600" algn="l" defTabSz="914400" rtl="0" eaLnBrk="1" latinLnBrk="0" hangingPunct="1">
+              <a:lnSpc>
+                <a:spcPct val="90000"/>
+              </a:lnSpc>
+              <a:spcBef>
+                <a:spcPts val="500"/>
+              </a:spcBef>
+              <a:buFont typeface="Arial" panose="020B0604020202020204" pitchFamily="34" charset="0"/>
+              <a:buChar char="•"/>
+              <a:defRPr sz="1800" kern="1200">
+                <a:solidFill>
+                  <a:schemeClr val="tx1"/>
+                </a:solidFill>
+                <a:latin typeface="+mn-lt"/>
+                <a:ea typeface="+mn-ea"/>
+                <a:cs typeface="+mn-cs"/>
+              </a:defRPr>
+            </a:lvl8pPr>
+            <a:lvl9pPr marL="3886200" indent="-228600" algn="l" defTabSz="914400" rtl="0" eaLnBrk="1" latinLnBrk="0" hangingPunct="1">
+              <a:lnSpc>
+                <a:spcPct val="90000"/>
+              </a:lnSpc>
+              <a:spcBef>
+                <a:spcPts val="500"/>
+              </a:spcBef>
+              <a:buFont typeface="Arial" panose="020B0604020202020204" pitchFamily="34" charset="0"/>
+              <a:buChar char="•"/>
+              <a:defRPr sz="1800" kern="1200">
+                <a:solidFill>
+                  <a:schemeClr val="tx1"/>
+                </a:solidFill>
+                <a:latin typeface="+mn-lt"/>
+                <a:ea typeface="+mn-ea"/>
+                <a:cs typeface="+mn-cs"/>
+              </a:defRPr>
+            </a:lvl9pPr>
+          </a:lstStyle>
+          <a:p>
+            <a:r>
+              <a:rPr lang="en-US" dirty="0"/>
+              <a:t>2019 – r value is 0.04</a:t>
+            </a:r>
+          </a:p>
+          <a:p>
+            <a:r>
+              <a:rPr lang="en-US" dirty="0"/>
+              <a:t>2020 – </a:t>
+            </a:r>
+            <a:r>
+              <a:rPr lang="en-US" dirty="0" err="1"/>
+              <a:t>rvalue</a:t>
+            </a:r>
+            <a:r>
+              <a:rPr lang="en-US" dirty="0"/>
+              <a:t> is 0.03</a:t>
+            </a:r>
+          </a:p>
+          <a:p>
+            <a:r>
+              <a:rPr lang="en-US" dirty="0"/>
+              <a:t>There is only weak correlation between Review rating and Price per Night of a listing in AirBnB.</a:t>
+            </a:r>
+          </a:p>
+        </p:txBody>
+      </p:sp>
+    </p:spTree>
+    <p:extLst>
+      <p:ext uri="{BB962C8B-B14F-4D97-AF65-F5344CB8AC3E}">
+        <p14:creationId xmlns:p14="http://schemas.microsoft.com/office/powerpoint/2010/main" val="452431008"/>
+      </p:ext>
+    </p:extLst>
+  </p:cSld>
+  <p:clrMapOvr>
+    <a:masterClrMapping/>
+  </p:clrMapOvr>
+</p:sld>
+</file>
+
+<file path=ppt/slides/slide15.xml><?xml version="1.0" encoding="utf-8"?>
+<p:sld xmlns:a="http://schemas.openxmlformats.org/drawingml/2006/main" xmlns:r="http://schemas.openxmlformats.org/officeDocument/2006/relationships" xmlns:p="http://schemas.openxmlformats.org/presentationml/2006/main">
+  <p:cSld>
+    <p:spTree>
+      <p:nvGrpSpPr>
+        <p:cNvPr id="1" name=""/>
+        <p:cNvGrpSpPr/>
+        <p:nvPr/>
+      </p:nvGrpSpPr>
+      <p:grpSpPr>
+        <a:xfrm>
+          <a:off x="0" y="0"/>
+          <a:ext cx="0" cy="0"/>
+          <a:chOff x="0" y="0"/>
+          <a:chExt cx="0" cy="0"/>
+        </a:xfrm>
+      </p:grpSpPr>
+      <p:pic>
+        <p:nvPicPr>
+          <p:cNvPr id="9" name="Content Placeholder 8" descr="Chart, scatter chart&#10;&#10;Description automatically generated">
+            <a:extLst>
+              <a:ext uri="{FF2B5EF4-FFF2-40B4-BE49-F238E27FC236}">
+                <a16:creationId xmlns:a16="http://schemas.microsoft.com/office/drawing/2014/main" id="{662373C4-151F-4062-B9C2-B7BB79B0AE34}"/>
+              </a:ext>
+            </a:extLst>
+          </p:cNvPr>
+          <p:cNvPicPr>
+            <a:picLocks noGrp="1" noChangeAspect="1"/>
+          </p:cNvPicPr>
+          <p:nvPr>
+            <p:ph sz="quarter" idx="16"/>
+          </p:nvPr>
+        </p:nvPicPr>
+        <p:blipFill>
+          <a:blip r:embed="rId2"/>
+          <a:stretch>
+            <a:fillRect/>
+          </a:stretch>
+        </p:blipFill>
+        <p:spPr>
+          <a:xfrm>
+            <a:off x="6270496" y="57755"/>
+            <a:ext cx="5056867" cy="3371245"/>
+          </a:xfrm>
+        </p:spPr>
+      </p:pic>
+      <p:sp>
+        <p:nvSpPr>
+          <p:cNvPr id="3" name="Title 2">
+            <a:extLst>
+              <a:ext uri="{FF2B5EF4-FFF2-40B4-BE49-F238E27FC236}">
+                <a16:creationId xmlns:a16="http://schemas.microsoft.com/office/drawing/2014/main" id="{F70C9DCA-7015-46A9-9793-5DF3B8BD9464}"/>
+              </a:ext>
+            </a:extLst>
+          </p:cNvPr>
+          <p:cNvSpPr>
+            <a:spLocks noGrp="1"/>
+          </p:cNvSpPr>
+          <p:nvPr>
+            <p:ph type="title"/>
+          </p:nvPr>
+        </p:nvSpPr>
+        <p:spPr>
+          <a:xfrm>
+            <a:off x="433136" y="1099002"/>
+            <a:ext cx="4507831" cy="573989"/>
+          </a:xfrm>
+        </p:spPr>
+        <p:txBody>
+          <a:bodyPr/>
+          <a:lstStyle/>
+          <a:p>
+            <a:r>
+              <a:rPr lang="en-AU" dirty="0"/>
+              <a:t>Price per Night vs Number of Days Booked</a:t>
+            </a:r>
+          </a:p>
+        </p:txBody>
+      </p:sp>
+      <p:pic>
+        <p:nvPicPr>
+          <p:cNvPr id="11" name="Content Placeholder 10" descr="Chart, scatter chart&#10;&#10;Description automatically generated">
+            <a:extLst>
+              <a:ext uri="{FF2B5EF4-FFF2-40B4-BE49-F238E27FC236}">
+                <a16:creationId xmlns:a16="http://schemas.microsoft.com/office/drawing/2014/main" id="{C135BA80-79E9-4BB1-84A9-5C1A2A30144C}"/>
+              </a:ext>
+            </a:extLst>
+          </p:cNvPr>
+          <p:cNvPicPr>
+            <a:picLocks noGrp="1" noChangeAspect="1"/>
+          </p:cNvPicPr>
+          <p:nvPr>
+            <p:ph idx="1"/>
+          </p:nvPr>
+        </p:nvPicPr>
+        <p:blipFill>
+          <a:blip r:embed="rId3"/>
+          <a:stretch>
+            <a:fillRect/>
+          </a:stretch>
+        </p:blipFill>
+        <p:spPr>
+          <a:xfrm>
+            <a:off x="6270496" y="3486755"/>
+            <a:ext cx="5056867" cy="3371245"/>
+          </a:xfrm>
+        </p:spPr>
+      </p:pic>
+      <p:sp>
+        <p:nvSpPr>
+          <p:cNvPr id="6" name="Footer Placeholder 5">
+            <a:extLst>
+              <a:ext uri="{FF2B5EF4-FFF2-40B4-BE49-F238E27FC236}">
+                <a16:creationId xmlns:a16="http://schemas.microsoft.com/office/drawing/2014/main" id="{5E9771BB-922B-45C7-8F7A-7FE6A6E5BE57}"/>
+              </a:ext>
+            </a:extLst>
+          </p:cNvPr>
+          <p:cNvSpPr>
+            <a:spLocks noGrp="1"/>
+          </p:cNvSpPr>
+          <p:nvPr>
+            <p:ph type="ftr" sz="quarter" idx="17"/>
+          </p:nvPr>
+        </p:nvSpPr>
+        <p:spPr/>
+        <p:txBody>
+          <a:bodyPr/>
+          <a:lstStyle/>
+          <a:p>
+            <a:r>
+              <a:rPr lang="en-US"/>
+              <a:t>Add a Footer</a:t>
+            </a:r>
+            <a:endParaRPr lang="en-US" dirty="0"/>
+          </a:p>
+        </p:txBody>
+      </p:sp>
+      <p:sp>
+        <p:nvSpPr>
+          <p:cNvPr id="7" name="Slide Number Placeholder 6">
+            <a:extLst>
+              <a:ext uri="{FF2B5EF4-FFF2-40B4-BE49-F238E27FC236}">
+                <a16:creationId xmlns:a16="http://schemas.microsoft.com/office/drawing/2014/main" id="{E5705F52-CC98-4118-8E92-EB49029870C1}"/>
+              </a:ext>
+            </a:extLst>
+          </p:cNvPr>
+          <p:cNvSpPr>
+            <a:spLocks noGrp="1"/>
+          </p:cNvSpPr>
+          <p:nvPr>
+            <p:ph type="sldNum" sz="quarter" idx="18"/>
+          </p:nvPr>
+        </p:nvSpPr>
+        <p:spPr/>
+        <p:txBody>
+          <a:bodyPr/>
+          <a:lstStyle/>
+          <a:p>
+            <a:fld id="{8C2E478F-E849-4A8C-AF1F-CBCC78A7CBFA}" type="slidenum">
+              <a:rPr lang="en-US" smtClean="0"/>
+              <a:pPr/>
+              <a:t>15</a:t>
+            </a:fld>
+            <a:endParaRPr lang="en-US" dirty="0"/>
+          </a:p>
+        </p:txBody>
+      </p:sp>
+      <p:sp>
+        <p:nvSpPr>
+          <p:cNvPr id="12" name="Content Placeholder 3">
+            <a:extLst>
+              <a:ext uri="{FF2B5EF4-FFF2-40B4-BE49-F238E27FC236}">
+                <a16:creationId xmlns:a16="http://schemas.microsoft.com/office/drawing/2014/main" id="{2B940960-AB3C-440B-8E44-61322560DB52}"/>
+              </a:ext>
+            </a:extLst>
+          </p:cNvPr>
+          <p:cNvSpPr txBox="1">
+            <a:spLocks/>
+          </p:cNvSpPr>
+          <p:nvPr/>
+        </p:nvSpPr>
+        <p:spPr>
+          <a:xfrm>
+            <a:off x="611804" y="2032939"/>
+            <a:ext cx="4226024" cy="3857329"/>
+          </a:xfrm>
+          <a:prstGeom prst="rect">
+            <a:avLst/>
+          </a:prstGeom>
+        </p:spPr>
+        <p:txBody>
+          <a:bodyPr vert="horz" lIns="0" tIns="45720" rIns="0" bIns="45720" rtlCol="0">
+            <a:normAutofit/>
+          </a:bodyPr>
+          <a:lstStyle>
+            <a:lvl1pPr marL="228600" indent="-228600" algn="l" defTabSz="914400" rtl="0" eaLnBrk="1" latinLnBrk="0" hangingPunct="1">
+              <a:lnSpc>
+                <a:spcPct val="150000"/>
+              </a:lnSpc>
+              <a:spcBef>
+                <a:spcPts val="1000"/>
+              </a:spcBef>
+              <a:buFont typeface="Arial" panose="020B0604020202020204" pitchFamily="34" charset="0"/>
+              <a:buChar char="•"/>
+              <a:defRPr sz="1600" kern="1200">
+                <a:solidFill>
+                  <a:schemeClr val="bg1"/>
+                </a:solidFill>
+                <a:latin typeface="+mn-lt"/>
+                <a:ea typeface="+mn-ea"/>
+                <a:cs typeface="+mn-cs"/>
+              </a:defRPr>
+            </a:lvl1pPr>
+            <a:lvl2pPr marL="685800" indent="-228600" algn="l" defTabSz="914400" rtl="0" eaLnBrk="1" latinLnBrk="0" hangingPunct="1">
+              <a:lnSpc>
+                <a:spcPct val="150000"/>
+              </a:lnSpc>
+              <a:spcBef>
+                <a:spcPts val="500"/>
+              </a:spcBef>
+              <a:buFont typeface="Arial" panose="020B0604020202020204" pitchFamily="34" charset="0"/>
+              <a:buChar char="•"/>
+              <a:defRPr sz="1600" kern="1200">
+                <a:solidFill>
+                  <a:schemeClr val="bg1"/>
+                </a:solidFill>
+                <a:latin typeface="+mn-lt"/>
+                <a:ea typeface="+mn-ea"/>
+                <a:cs typeface="+mn-cs"/>
+              </a:defRPr>
+            </a:lvl2pPr>
+            <a:lvl3pPr marL="1143000" indent="-228600" algn="l" defTabSz="914400" rtl="0" eaLnBrk="1" latinLnBrk="0" hangingPunct="1">
+              <a:lnSpc>
+                <a:spcPct val="150000"/>
+              </a:lnSpc>
+              <a:spcBef>
+                <a:spcPts val="500"/>
+              </a:spcBef>
+              <a:buFont typeface="Arial" panose="020B0604020202020204" pitchFamily="34" charset="0"/>
+              <a:buChar char="•"/>
+              <a:defRPr sz="1400" kern="1200">
+                <a:solidFill>
+                  <a:schemeClr val="bg1"/>
+                </a:solidFill>
+                <a:latin typeface="+mn-lt"/>
+                <a:ea typeface="+mn-ea"/>
+                <a:cs typeface="+mn-cs"/>
+              </a:defRPr>
+            </a:lvl3pPr>
+            <a:lvl4pPr marL="1600200" indent="-228600" algn="l" defTabSz="914400" rtl="0" eaLnBrk="1" latinLnBrk="0" hangingPunct="1">
+              <a:lnSpc>
+                <a:spcPct val="150000"/>
+              </a:lnSpc>
+              <a:spcBef>
+                <a:spcPts val="500"/>
+              </a:spcBef>
+              <a:buFont typeface="Arial" panose="020B0604020202020204" pitchFamily="34" charset="0"/>
+              <a:buChar char="•"/>
+              <a:defRPr sz="1200" kern="1200">
+                <a:solidFill>
+                  <a:schemeClr val="bg1"/>
+                </a:solidFill>
+                <a:latin typeface="+mn-lt"/>
+                <a:ea typeface="+mn-ea"/>
+                <a:cs typeface="+mn-cs"/>
+              </a:defRPr>
+            </a:lvl4pPr>
+            <a:lvl5pPr marL="2057400" indent="-228600" algn="l" defTabSz="914400" rtl="0" eaLnBrk="1" latinLnBrk="0" hangingPunct="1">
+              <a:lnSpc>
+                <a:spcPct val="150000"/>
+              </a:lnSpc>
+              <a:spcBef>
+                <a:spcPts val="500"/>
+              </a:spcBef>
+              <a:buFont typeface="Arial" panose="020B0604020202020204" pitchFamily="34" charset="0"/>
+              <a:buChar char="•"/>
+              <a:defRPr sz="1200" kern="1200">
+                <a:solidFill>
+                  <a:schemeClr val="bg1"/>
+                </a:solidFill>
+                <a:latin typeface="+mn-lt"/>
+                <a:ea typeface="+mn-ea"/>
+                <a:cs typeface="+mn-cs"/>
+              </a:defRPr>
+            </a:lvl5pPr>
+            <a:lvl6pPr marL="2514600" indent="-228600" algn="l" defTabSz="914400" rtl="0" eaLnBrk="1" latinLnBrk="0" hangingPunct="1">
+              <a:lnSpc>
+                <a:spcPct val="90000"/>
+              </a:lnSpc>
+              <a:spcBef>
+                <a:spcPts val="500"/>
+              </a:spcBef>
+              <a:buFont typeface="Arial" panose="020B0604020202020204" pitchFamily="34" charset="0"/>
+              <a:buChar char="•"/>
+              <a:defRPr sz="1800" kern="1200">
+                <a:solidFill>
+                  <a:schemeClr val="tx1"/>
+                </a:solidFill>
+                <a:latin typeface="+mn-lt"/>
+                <a:ea typeface="+mn-ea"/>
+                <a:cs typeface="+mn-cs"/>
+              </a:defRPr>
+            </a:lvl6pPr>
+            <a:lvl7pPr marL="2971800" indent="-228600" algn="l" defTabSz="914400" rtl="0" eaLnBrk="1" latinLnBrk="0" hangingPunct="1">
+              <a:lnSpc>
+                <a:spcPct val="90000"/>
+              </a:lnSpc>
+              <a:spcBef>
+                <a:spcPts val="500"/>
+              </a:spcBef>
+              <a:buFont typeface="Arial" panose="020B0604020202020204" pitchFamily="34" charset="0"/>
+              <a:buChar char="•"/>
+              <a:defRPr sz="1800" kern="1200">
+                <a:solidFill>
+                  <a:schemeClr val="tx1"/>
+                </a:solidFill>
+                <a:latin typeface="+mn-lt"/>
+                <a:ea typeface="+mn-ea"/>
+                <a:cs typeface="+mn-cs"/>
+              </a:defRPr>
+            </a:lvl7pPr>
+            <a:lvl8pPr marL="3429000" indent="-228600" algn="l" defTabSz="914400" rtl="0" eaLnBrk="1" latinLnBrk="0" hangingPunct="1">
+              <a:lnSpc>
+                <a:spcPct val="90000"/>
+              </a:lnSpc>
+              <a:spcBef>
+                <a:spcPts val="500"/>
+              </a:spcBef>
+              <a:buFont typeface="Arial" panose="020B0604020202020204" pitchFamily="34" charset="0"/>
+              <a:buChar char="•"/>
+              <a:defRPr sz="1800" kern="1200">
+                <a:solidFill>
+                  <a:schemeClr val="tx1"/>
+                </a:solidFill>
+                <a:latin typeface="+mn-lt"/>
+                <a:ea typeface="+mn-ea"/>
+                <a:cs typeface="+mn-cs"/>
+              </a:defRPr>
+            </a:lvl8pPr>
+            <a:lvl9pPr marL="3886200" indent="-228600" algn="l" defTabSz="914400" rtl="0" eaLnBrk="1" latinLnBrk="0" hangingPunct="1">
+              <a:lnSpc>
+                <a:spcPct val="90000"/>
+              </a:lnSpc>
+              <a:spcBef>
+                <a:spcPts val="500"/>
+              </a:spcBef>
+              <a:buFont typeface="Arial" panose="020B0604020202020204" pitchFamily="34" charset="0"/>
+              <a:buChar char="•"/>
+              <a:defRPr sz="1800" kern="1200">
+                <a:solidFill>
+                  <a:schemeClr val="tx1"/>
+                </a:solidFill>
+                <a:latin typeface="+mn-lt"/>
+                <a:ea typeface="+mn-ea"/>
+                <a:cs typeface="+mn-cs"/>
+              </a:defRPr>
+            </a:lvl9pPr>
+          </a:lstStyle>
+          <a:p>
+            <a:r>
+              <a:rPr lang="en-US" dirty="0"/>
+              <a:t>2019 – r value is -0.11</a:t>
+            </a:r>
+          </a:p>
+          <a:p>
+            <a:r>
+              <a:rPr lang="en-US" dirty="0"/>
+              <a:t>2020 – r value is -0.04</a:t>
+            </a:r>
+          </a:p>
+          <a:p>
+            <a:r>
+              <a:rPr lang="en-US" dirty="0"/>
+              <a:t>There is only weak correlation between Price per Night and Number of days booked for a listing in AirBnB.</a:t>
+            </a:r>
+          </a:p>
+        </p:txBody>
+      </p:sp>
+    </p:spTree>
+    <p:extLst>
+      <p:ext uri="{BB962C8B-B14F-4D97-AF65-F5344CB8AC3E}">
+        <p14:creationId xmlns:p14="http://schemas.microsoft.com/office/powerpoint/2010/main" val="1470054895"/>
+      </p:ext>
+    </p:extLst>
+  </p:cSld>
+  <p:clrMapOvr>
+    <a:masterClrMapping/>
+  </p:clrMapOvr>
+</p:sld>
+</file>
+
+<file path=ppt/slides/slide16.xml><?xml version="1.0" encoding="utf-8"?>
+<p:sld xmlns:a="http://schemas.openxmlformats.org/drawingml/2006/main" xmlns:r="http://schemas.openxmlformats.org/officeDocument/2006/relationships" xmlns:p="http://schemas.openxmlformats.org/presentationml/2006/main">
+  <p:cSld>
+    <p:spTree>
+      <p:nvGrpSpPr>
+        <p:cNvPr id="1" name=""/>
+        <p:cNvGrpSpPr/>
+        <p:nvPr/>
+      </p:nvGrpSpPr>
+      <p:grpSpPr>
+        <a:xfrm>
+          <a:off x="0" y="0"/>
+          <a:ext cx="0" cy="0"/>
+          <a:chOff x="0" y="0"/>
+          <a:chExt cx="0" cy="0"/>
+        </a:xfrm>
+      </p:grpSpPr>
+      <p:pic>
+        <p:nvPicPr>
+          <p:cNvPr id="9" name="Content Placeholder 8" descr="Chart, scatter chart&#10;&#10;Description automatically generated">
+            <a:extLst>
+              <a:ext uri="{FF2B5EF4-FFF2-40B4-BE49-F238E27FC236}">
+                <a16:creationId xmlns:a16="http://schemas.microsoft.com/office/drawing/2014/main" id="{01D7F317-3D86-4580-988F-3839D7B9D31D}"/>
+              </a:ext>
+            </a:extLst>
+          </p:cNvPr>
+          <p:cNvPicPr>
+            <a:picLocks noGrp="1" noChangeAspect="1"/>
+          </p:cNvPicPr>
+          <p:nvPr>
+            <p:ph sz="quarter" idx="16"/>
+          </p:nvPr>
+        </p:nvPicPr>
+        <p:blipFill>
+          <a:blip r:embed="rId2"/>
+          <a:stretch>
+            <a:fillRect/>
+          </a:stretch>
+        </p:blipFill>
+        <p:spPr>
+          <a:xfrm>
+            <a:off x="6569241" y="100865"/>
+            <a:ext cx="4716378" cy="3144252"/>
+          </a:xfrm>
+        </p:spPr>
+      </p:pic>
+      <p:sp>
+        <p:nvSpPr>
+          <p:cNvPr id="3" name="Title 2">
+            <a:extLst>
+              <a:ext uri="{FF2B5EF4-FFF2-40B4-BE49-F238E27FC236}">
+                <a16:creationId xmlns:a16="http://schemas.microsoft.com/office/drawing/2014/main" id="{2A269B90-9206-477D-82C6-71B6F774E4C3}"/>
+              </a:ext>
+            </a:extLst>
+          </p:cNvPr>
+          <p:cNvSpPr>
+            <a:spLocks noGrp="1"/>
+          </p:cNvSpPr>
+          <p:nvPr>
+            <p:ph type="title"/>
+          </p:nvPr>
+        </p:nvSpPr>
+        <p:spPr/>
+        <p:txBody>
+          <a:bodyPr/>
+          <a:lstStyle/>
+          <a:p>
+            <a:r>
+              <a:rPr lang="en-AU" dirty="0"/>
+              <a:t>Host Response Rate vs Number of Days Booked</a:t>
+            </a:r>
+          </a:p>
+        </p:txBody>
+      </p:sp>
+      <p:sp>
+        <p:nvSpPr>
+          <p:cNvPr id="4" name="Content Placeholder 3">
+            <a:extLst>
+              <a:ext uri="{FF2B5EF4-FFF2-40B4-BE49-F238E27FC236}">
+                <a16:creationId xmlns:a16="http://schemas.microsoft.com/office/drawing/2014/main" id="{42A1F5D4-9AB9-48BA-9412-D15764A5AE9F}"/>
+              </a:ext>
+            </a:extLst>
+          </p:cNvPr>
+          <p:cNvSpPr>
+            <a:spLocks noGrp="1"/>
+          </p:cNvSpPr>
+          <p:nvPr>
+            <p:ph idx="1"/>
+          </p:nvPr>
+        </p:nvSpPr>
+        <p:spPr/>
+        <p:txBody>
+          <a:bodyPr/>
+          <a:lstStyle/>
+          <a:p>
+            <a:r>
+              <a:rPr lang="en-AU" dirty="0"/>
+              <a:t>2019 – r value is -0.34</a:t>
+            </a:r>
+          </a:p>
+          <a:p>
+            <a:r>
+              <a:rPr lang="en-AU" dirty="0"/>
+              <a:t>2020 – r value is -0.4</a:t>
+            </a:r>
+          </a:p>
+          <a:p>
+            <a:r>
+              <a:rPr lang="en-AU" dirty="0"/>
+              <a:t>There is moderate correlation between Host Response Rate and Number of Days booked for a listing in </a:t>
+            </a:r>
+            <a:r>
+              <a:rPr lang="en-AU" dirty="0" err="1"/>
+              <a:t>AirBnB</a:t>
+            </a:r>
+            <a:r>
+              <a:rPr lang="en-AU" dirty="0"/>
+              <a:t>.</a:t>
+            </a:r>
+          </a:p>
+          <a:p>
+            <a:endParaRPr lang="en-AU" dirty="0"/>
+          </a:p>
+        </p:txBody>
+      </p:sp>
+      <p:sp>
+        <p:nvSpPr>
+          <p:cNvPr id="6" name="Footer Placeholder 5">
+            <a:extLst>
+              <a:ext uri="{FF2B5EF4-FFF2-40B4-BE49-F238E27FC236}">
+                <a16:creationId xmlns:a16="http://schemas.microsoft.com/office/drawing/2014/main" id="{479098A1-826E-405B-AF8F-663F6A7E321B}"/>
+              </a:ext>
+            </a:extLst>
+          </p:cNvPr>
+          <p:cNvSpPr>
+            <a:spLocks noGrp="1"/>
+          </p:cNvSpPr>
+          <p:nvPr>
+            <p:ph type="ftr" sz="quarter" idx="17"/>
+          </p:nvPr>
+        </p:nvSpPr>
+        <p:spPr/>
+        <p:txBody>
+          <a:bodyPr/>
+          <a:lstStyle/>
+          <a:p>
+            <a:r>
+              <a:rPr lang="en-US"/>
+              <a:t>Add a Footer</a:t>
+            </a:r>
+            <a:endParaRPr lang="en-US" dirty="0"/>
+          </a:p>
+        </p:txBody>
+      </p:sp>
+      <p:sp>
+        <p:nvSpPr>
+          <p:cNvPr id="7" name="Slide Number Placeholder 6">
+            <a:extLst>
+              <a:ext uri="{FF2B5EF4-FFF2-40B4-BE49-F238E27FC236}">
+                <a16:creationId xmlns:a16="http://schemas.microsoft.com/office/drawing/2014/main" id="{4BD53386-CCBC-44E2-8B15-7073FFE81F12}"/>
+              </a:ext>
+            </a:extLst>
+          </p:cNvPr>
+          <p:cNvSpPr>
+            <a:spLocks noGrp="1"/>
+          </p:cNvSpPr>
+          <p:nvPr>
+            <p:ph type="sldNum" sz="quarter" idx="18"/>
+          </p:nvPr>
+        </p:nvSpPr>
+        <p:spPr/>
+        <p:txBody>
+          <a:bodyPr/>
+          <a:lstStyle/>
+          <a:p>
+            <a:fld id="{8C2E478F-E849-4A8C-AF1F-CBCC78A7CBFA}" type="slidenum">
+              <a:rPr lang="en-US" smtClean="0"/>
+              <a:pPr/>
+              <a:t>16</a:t>
+            </a:fld>
+            <a:endParaRPr lang="en-US" dirty="0"/>
+          </a:p>
+        </p:txBody>
+      </p:sp>
+      <p:pic>
+        <p:nvPicPr>
+          <p:cNvPr id="11" name="Picture 10" descr="Chart, scatter chart&#10;&#10;Description automatically generated">
+            <a:extLst>
+              <a:ext uri="{FF2B5EF4-FFF2-40B4-BE49-F238E27FC236}">
+                <a16:creationId xmlns:a16="http://schemas.microsoft.com/office/drawing/2014/main" id="{ED90A349-3CC1-49C9-A0D8-59B80BC3670E}"/>
+              </a:ext>
+            </a:extLst>
+          </p:cNvPr>
+          <p:cNvPicPr>
+            <a:picLocks noChangeAspect="1"/>
+          </p:cNvPicPr>
+          <p:nvPr/>
+        </p:nvPicPr>
+        <p:blipFill>
+          <a:blip r:embed="rId3"/>
+          <a:stretch>
+            <a:fillRect/>
+          </a:stretch>
+        </p:blipFill>
+        <p:spPr>
+          <a:xfrm>
+            <a:off x="6569241" y="3485148"/>
+            <a:ext cx="4716378" cy="3144252"/>
+          </a:xfrm>
+          <a:prstGeom prst="rect">
+            <a:avLst/>
+          </a:prstGeom>
+        </p:spPr>
+      </p:pic>
+    </p:spTree>
+    <p:extLst>
+      <p:ext uri="{BB962C8B-B14F-4D97-AF65-F5344CB8AC3E}">
+        <p14:creationId xmlns:p14="http://schemas.microsoft.com/office/powerpoint/2010/main" val="3833922747"/>
+      </p:ext>
+    </p:extLst>
+  </p:cSld>
+  <p:clrMapOvr>
+    <a:masterClrMapping/>
+  </p:clrMapOvr>
+</p:sld>
+</file>
+
+<file path=ppt/slides/slide17.xml><?xml version="1.0" encoding="utf-8"?>
+<p:sld xmlns:a="http://schemas.openxmlformats.org/drawingml/2006/main" xmlns:r="http://schemas.openxmlformats.org/officeDocument/2006/relationships" xmlns:p="http://schemas.openxmlformats.org/presentationml/2006/main">
+  <p:cSld>
+    <p:spTree>
+      <p:nvGrpSpPr>
+        <p:cNvPr id="1" name=""/>
+        <p:cNvGrpSpPr/>
+        <p:nvPr/>
+      </p:nvGrpSpPr>
+      <p:grpSpPr>
+        <a:xfrm>
+          <a:off x="0" y="0"/>
+          <a:ext cx="0" cy="0"/>
+          <a:chOff x="0" y="0"/>
+          <a:chExt cx="0" cy="0"/>
+        </a:xfrm>
+      </p:grpSpPr>
       <p:sp>
         <p:nvSpPr>
           <p:cNvPr id="8" name="Title 7" hidden="1">
@@ -11033,7 +13074,7 @@
             <a:fld id="{8C2E478F-E849-4A8C-AF1F-CBCC78A7CBFA}" type="slidenum">
               <a:rPr lang="en-US" smtClean="0"/>
               <a:pPr/>
-              <a:t>10</a:t>
+              <a:t>17</a:t>
             </a:fld>
             <a:endParaRPr lang="en-US" dirty="0"/>
           </a:p>
@@ -11052,7 +13093,7 @@
 </p:sld>
 </file>
 
-<file path=ppt/slides/slide11.xml><?xml version="1.0" encoding="utf-8"?>
+<file path=ppt/slides/slide18.xml><?xml version="1.0" encoding="utf-8"?>
 <p:sld xmlns:a="http://schemas.openxmlformats.org/drawingml/2006/main" xmlns:r="http://schemas.openxmlformats.org/officeDocument/2006/relationships" xmlns:p="http://schemas.openxmlformats.org/presentationml/2006/main">
   <p:cSld>
     <p:bg>
@@ -11590,7 +13631,7 @@
             <a:fld id="{8C2E478F-E849-4A8C-AF1F-CBCC78A7CBFA}" type="slidenum">
               <a:rPr lang="en-US" smtClean="0"/>
               <a:pPr/>
-              <a:t>11</a:t>
+              <a:t>18</a:t>
             </a:fld>
             <a:endParaRPr lang="en-US" dirty="0"/>
           </a:p>
@@ -11600,144 +13641,6 @@
     <p:extLst>
       <p:ext uri="{BB962C8B-B14F-4D97-AF65-F5344CB8AC3E}">
         <p14:creationId xmlns:p14="http://schemas.microsoft.com/office/powerpoint/2010/main" val="207078912"/>
-      </p:ext>
-    </p:extLst>
-  </p:cSld>
-  <p:clrMapOvr>
-    <a:masterClrMapping/>
-  </p:clrMapOvr>
-</p:sld>
-</file>
-
-<file path=ppt/slides/slide12.xml><?xml version="1.0" encoding="utf-8"?>
-<p:sld xmlns:a="http://schemas.openxmlformats.org/drawingml/2006/main" xmlns:r="http://schemas.openxmlformats.org/officeDocument/2006/relationships" xmlns:p="http://schemas.openxmlformats.org/presentationml/2006/main">
-  <p:cSld>
-    <p:spTree>
-      <p:nvGrpSpPr>
-        <p:cNvPr id="1" name=""/>
-        <p:cNvGrpSpPr/>
-        <p:nvPr/>
-      </p:nvGrpSpPr>
-      <p:grpSpPr>
-        <a:xfrm>
-          <a:off x="0" y="0"/>
-          <a:ext cx="0" cy="0"/>
-          <a:chOff x="0" y="0"/>
-          <a:chExt cx="0" cy="0"/>
-        </a:xfrm>
-      </p:grpSpPr>
-      <p:sp>
-        <p:nvSpPr>
-          <p:cNvPr id="2" name="Slide Number Placeholder 1">
-            <a:extLst>
-              <a:ext uri="{FF2B5EF4-FFF2-40B4-BE49-F238E27FC236}">
-                <a16:creationId xmlns:a16="http://schemas.microsoft.com/office/drawing/2014/main" id="{D886D306-B4E6-47AF-A7F0-22B0BB044488}"/>
-              </a:ext>
-            </a:extLst>
-          </p:cNvPr>
-          <p:cNvSpPr>
-            <a:spLocks noGrp="1"/>
-          </p:cNvSpPr>
-          <p:nvPr>
-            <p:ph type="sldNum" sz="quarter" idx="11"/>
-          </p:nvPr>
-        </p:nvSpPr>
-        <p:spPr/>
-        <p:txBody>
-          <a:bodyPr/>
-          <a:lstStyle/>
-          <a:p>
-            <a:fld id="{8C2E478F-E849-4A8C-AF1F-CBCC78A7CBFA}" type="slidenum">
-              <a:rPr lang="en-US" smtClean="0"/>
-              <a:pPr/>
-              <a:t>12</a:t>
-            </a:fld>
-            <a:endParaRPr lang="en-US" dirty="0"/>
-          </a:p>
-        </p:txBody>
-      </p:sp>
-      <p:sp>
-        <p:nvSpPr>
-          <p:cNvPr id="4" name="Title 3">
-            <a:extLst>
-              <a:ext uri="{FF2B5EF4-FFF2-40B4-BE49-F238E27FC236}">
-                <a16:creationId xmlns:a16="http://schemas.microsoft.com/office/drawing/2014/main" id="{E98DCA46-603B-4178-8707-30E192CE6B8D}"/>
-              </a:ext>
-            </a:extLst>
-          </p:cNvPr>
-          <p:cNvSpPr>
-            <a:spLocks noGrp="1"/>
-          </p:cNvSpPr>
-          <p:nvPr>
-            <p:ph type="title"/>
-          </p:nvPr>
-        </p:nvSpPr>
-        <p:spPr/>
-        <p:txBody>
-          <a:bodyPr/>
-          <a:lstStyle/>
-          <a:p>
-            <a:r>
-              <a:rPr lang="en-US" dirty="0"/>
-              <a:t>Customize this Template</a:t>
-            </a:r>
-          </a:p>
-        </p:txBody>
-      </p:sp>
-      <p:sp>
-        <p:nvSpPr>
-          <p:cNvPr id="3" name="Text Placeholder 2">
-            <a:extLst>
-              <a:ext uri="{FF2B5EF4-FFF2-40B4-BE49-F238E27FC236}">
-                <a16:creationId xmlns:a16="http://schemas.microsoft.com/office/drawing/2014/main" id="{B84C3A53-760B-4DC4-9550-B0B5BB606FCD}"/>
-              </a:ext>
-            </a:extLst>
-          </p:cNvPr>
-          <p:cNvSpPr>
-            <a:spLocks noGrp="1"/>
-          </p:cNvSpPr>
-          <p:nvPr>
-            <p:ph type="body" sz="quarter" idx="4294967295"/>
-          </p:nvPr>
-        </p:nvSpPr>
-        <p:spPr>
-          <a:xfrm>
-            <a:off x="1587500" y="1722438"/>
-            <a:ext cx="9017000" cy="3413125"/>
-          </a:xfrm>
-        </p:spPr>
-        <p:txBody>
-          <a:bodyPr anchor="ctr">
-            <a:normAutofit/>
-          </a:bodyPr>
-          <a:lstStyle/>
-          <a:p>
-            <a:pPr marL="0" indent="0" algn="ctr">
-              <a:lnSpc>
-                <a:spcPct val="100000"/>
-              </a:lnSpc>
-              <a:buNone/>
-            </a:pPr>
-            <a:r>
-              <a:rPr lang="en-US" sz="6000" u="sng" dirty="0">
-                <a:hlinkClick r:id="rId2">
-                  <a:extLst>
-                    <a:ext uri="{A12FA001-AC4F-418D-AE19-62706E023703}">
-                      <ahyp:hlinkClr xmlns:ahyp="http://schemas.microsoft.com/office/drawing/2018/hyperlinkcolor" val="tx"/>
-                    </a:ext>
-                  </a:extLst>
-                </a:hlinkClick>
-              </a:rPr>
-              <a:t>Template Editing Instructions and Feedback</a:t>
-            </a:r>
-            <a:endParaRPr lang="en-US" sz="6000" u="sng" dirty="0"/>
-          </a:p>
-        </p:txBody>
-      </p:sp>
-    </p:spTree>
-    <p:extLst>
-      <p:ext uri="{BB962C8B-B14F-4D97-AF65-F5344CB8AC3E}">
-        <p14:creationId xmlns:p14="http://schemas.microsoft.com/office/powerpoint/2010/main" val="59582380"/>
       </p:ext>
     </p:extLst>
   </p:cSld>
@@ -12676,6 +14579,313 @@
       </p:grpSpPr>
       <p:sp>
         <p:nvSpPr>
+          <p:cNvPr id="7" name="Title 6">
+            <a:extLst>
+              <a:ext uri="{FF2B5EF4-FFF2-40B4-BE49-F238E27FC236}">
+                <a16:creationId xmlns:a16="http://schemas.microsoft.com/office/drawing/2014/main" id="{D5445F47-6D74-450C-BC16-998D2021AD78}"/>
+              </a:ext>
+            </a:extLst>
+          </p:cNvPr>
+          <p:cNvSpPr>
+            <a:spLocks noGrp="1"/>
+          </p:cNvSpPr>
+          <p:nvPr>
+            <p:ph type="title"/>
+          </p:nvPr>
+        </p:nvSpPr>
+        <p:spPr>
+          <a:xfrm>
+            <a:off x="957942" y="110247"/>
+            <a:ext cx="5138057" cy="979308"/>
+          </a:xfrm>
+        </p:spPr>
+        <p:txBody>
+          <a:bodyPr/>
+          <a:lstStyle/>
+          <a:p>
+            <a:r>
+              <a:rPr lang="en-US" dirty="0"/>
+              <a:t>Why This Project &amp; Data?</a:t>
+            </a:r>
+          </a:p>
+        </p:txBody>
+      </p:sp>
+      <p:sp>
+        <p:nvSpPr>
+          <p:cNvPr id="8" name="Text Placeholder 7">
+            <a:extLst>
+              <a:ext uri="{FF2B5EF4-FFF2-40B4-BE49-F238E27FC236}">
+                <a16:creationId xmlns:a16="http://schemas.microsoft.com/office/drawing/2014/main" id="{E79DECD2-B85E-4CB3-BBFB-C64131454B65}"/>
+              </a:ext>
+            </a:extLst>
+          </p:cNvPr>
+          <p:cNvSpPr>
+            <a:spLocks noGrp="1"/>
+          </p:cNvSpPr>
+          <p:nvPr>
+            <p:ph type="body" sz="half" idx="2"/>
+          </p:nvPr>
+        </p:nvSpPr>
+        <p:spPr>
+          <a:xfrm>
+            <a:off x="980760" y="1157858"/>
+            <a:ext cx="5138057" cy="4542284"/>
+          </a:xfrm>
+        </p:spPr>
+        <p:txBody>
+          <a:bodyPr>
+            <a:normAutofit/>
+          </a:bodyPr>
+          <a:lstStyle/>
+          <a:p>
+            <a:pPr>
+              <a:lnSpc>
+                <a:spcPct val="100000"/>
+              </a:lnSpc>
+            </a:pPr>
+            <a:r>
+              <a:rPr lang="en-US" dirty="0"/>
+              <a:t>All three of our group have used AirBnB in Melbourne at some point in our lives, with a maximum stay of 1 month. We have also experienced the COVID lockdowns ad were interested to see the impact the hard lockdown and closed borders would have on a business with the model of AirBnB.</a:t>
+            </a:r>
+          </a:p>
+          <a:p>
+            <a:pPr>
+              <a:lnSpc>
+                <a:spcPct val="100000"/>
+              </a:lnSpc>
+            </a:pPr>
+            <a:endParaRPr lang="en-US" dirty="0"/>
+          </a:p>
+          <a:p>
+            <a:pPr>
+              <a:lnSpc>
+                <a:spcPct val="100000"/>
+              </a:lnSpc>
+            </a:pPr>
+            <a:r>
+              <a:rPr lang="en-US" dirty="0"/>
+              <a:t>Our initial thoughts were that the data from 2020 would show a significant impact in reduced listings and decreased availability in the listings.</a:t>
+            </a:r>
+          </a:p>
+          <a:p>
+            <a:pPr>
+              <a:lnSpc>
+                <a:spcPct val="100000"/>
+              </a:lnSpc>
+            </a:pPr>
+            <a:r>
+              <a:rPr lang="en-US" dirty="0"/>
+              <a:t>We also expected to see Melbourne City be the most booked location for AirBnB’s.</a:t>
+            </a:r>
+          </a:p>
+          <a:p>
+            <a:endParaRPr lang="en-US" dirty="0"/>
+          </a:p>
+        </p:txBody>
+      </p:sp>
+      <p:pic>
+        <p:nvPicPr>
+          <p:cNvPr id="5" name="Picture Placeholder 4" descr="Two Buildings" title="Two Buildings">
+            <a:extLst>
+              <a:ext uri="{FF2B5EF4-FFF2-40B4-BE49-F238E27FC236}">
+                <a16:creationId xmlns:a16="http://schemas.microsoft.com/office/drawing/2014/main" id="{9EF82849-1FFF-4EE2-B6A4-C19B8A083067}"/>
+              </a:ext>
+            </a:extLst>
+          </p:cNvPr>
+          <p:cNvPicPr>
+            <a:picLocks noGrp="1" noChangeAspect="1"/>
+          </p:cNvPicPr>
+          <p:nvPr>
+            <p:ph type="pic" idx="1"/>
+          </p:nvPr>
+        </p:nvPicPr>
+        <p:blipFill>
+          <a:blip r:embed="rId3">
+            <a:extLst>
+              <a:ext uri="{BEBA8EAE-BF5A-486C-A8C5-ECC9F3942E4B}">
+                <a14:imgProps xmlns:a14="http://schemas.microsoft.com/office/drawing/2010/main">
+                  <a14:imgLayer r:embed="rId4">
+                    <a14:imgEffect>
+                      <a14:brightnessContrast bright="-29000" contrast="24000"/>
+                    </a14:imgEffect>
+                  </a14:imgLayer>
+                </a14:imgProps>
+              </a:ext>
+              <a:ext uri="{28A0092B-C50C-407E-A947-70E740481C1C}">
+                <a14:useLocalDpi xmlns:a14="http://schemas.microsoft.com/office/drawing/2010/main" val="0"/>
+              </a:ext>
+            </a:extLst>
+          </a:blip>
+          <a:srcRect/>
+          <a:stretch>
+            <a:fillRect/>
+          </a:stretch>
+        </p:blipFill>
+        <p:spPr/>
+      </p:pic>
+      <p:sp>
+        <p:nvSpPr>
+          <p:cNvPr id="2" name="Footer Placeholder 1">
+            <a:extLst>
+              <a:ext uri="{FF2B5EF4-FFF2-40B4-BE49-F238E27FC236}">
+                <a16:creationId xmlns:a16="http://schemas.microsoft.com/office/drawing/2014/main" id="{F17BB2B3-BB1E-4588-97D3-522970C829A4}"/>
+              </a:ext>
+            </a:extLst>
+          </p:cNvPr>
+          <p:cNvSpPr>
+            <a:spLocks noGrp="1"/>
+          </p:cNvSpPr>
+          <p:nvPr>
+            <p:ph type="ftr" sz="quarter" idx="14"/>
+          </p:nvPr>
+        </p:nvSpPr>
+        <p:spPr/>
+        <p:txBody>
+          <a:bodyPr/>
+          <a:lstStyle/>
+          <a:p>
+            <a:r>
+              <a:rPr lang="en-US" dirty="0"/>
+              <a:t>Add a Footer</a:t>
+            </a:r>
+          </a:p>
+        </p:txBody>
+      </p:sp>
+      <p:sp>
+        <p:nvSpPr>
+          <p:cNvPr id="10" name="Rectangle: Single Corner Snipped 9" descr="Footer accent box">
+            <a:extLst>
+              <a:ext uri="{FF2B5EF4-FFF2-40B4-BE49-F238E27FC236}">
+                <a16:creationId xmlns:a16="http://schemas.microsoft.com/office/drawing/2014/main" id="{CDA9F8EC-2836-4D7A-8BB2-6D1C849515C1}"/>
+              </a:ext>
+            </a:extLst>
+          </p:cNvPr>
+          <p:cNvSpPr/>
+          <p:nvPr/>
+        </p:nvSpPr>
+        <p:spPr>
+          <a:xfrm flipH="1">
+            <a:off x="11549269" y="6356350"/>
+            <a:ext cx="642731" cy="501650"/>
+          </a:xfrm>
+          <a:prstGeom prst="snip1Rect">
+            <a:avLst/>
+          </a:prstGeom>
+          <a:gradFill>
+            <a:gsLst>
+              <a:gs pos="0">
+                <a:srgbClr val="038B30">
+                  <a:alpha val="70000"/>
+                </a:srgbClr>
+              </a:gs>
+              <a:gs pos="50000">
+                <a:srgbClr val="05EE55">
+                  <a:alpha val="70000"/>
+                </a:srgbClr>
+              </a:gs>
+              <a:gs pos="100000">
+                <a:srgbClr val="C0F400">
+                  <a:alpha val="70000"/>
+                </a:srgbClr>
+              </a:gs>
+            </a:gsLst>
+            <a:lin ang="5400000" scaled="1"/>
+          </a:gradFill>
+          <a:ln>
+            <a:noFill/>
+          </a:ln>
+        </p:spPr>
+        <p:style>
+          <a:lnRef idx="2">
+            <a:schemeClr val="accent1">
+              <a:shade val="50000"/>
+            </a:schemeClr>
+          </a:lnRef>
+          <a:fillRef idx="1">
+            <a:schemeClr val="accent1"/>
+          </a:fillRef>
+          <a:effectRef idx="0">
+            <a:schemeClr val="accent1"/>
+          </a:effectRef>
+          <a:fontRef idx="minor">
+            <a:schemeClr val="lt1"/>
+          </a:fontRef>
+        </p:style>
+        <p:txBody>
+          <a:bodyPr rtlCol="0" anchor="ctr"/>
+          <a:lstStyle/>
+          <a:p>
+            <a:pPr algn="ctr"/>
+            <a:endParaRPr lang="en-US" dirty="0">
+              <a:solidFill>
+                <a:schemeClr val="bg1"/>
+              </a:solidFill>
+            </a:endParaRPr>
+          </a:p>
+        </p:txBody>
+      </p:sp>
+      <p:sp>
+        <p:nvSpPr>
+          <p:cNvPr id="3" name="Slide Number Placeholder 2">
+            <a:extLst>
+              <a:ext uri="{FF2B5EF4-FFF2-40B4-BE49-F238E27FC236}">
+                <a16:creationId xmlns:a16="http://schemas.microsoft.com/office/drawing/2014/main" id="{C25E833F-FD8B-46E5-BD16-A82D3EDA8554}"/>
+              </a:ext>
+            </a:extLst>
+          </p:cNvPr>
+          <p:cNvSpPr>
+            <a:spLocks noGrp="1"/>
+          </p:cNvSpPr>
+          <p:nvPr>
+            <p:ph type="sldNum" sz="quarter" idx="15"/>
+          </p:nvPr>
+        </p:nvSpPr>
+        <p:spPr/>
+        <p:txBody>
+          <a:bodyPr/>
+          <a:lstStyle/>
+          <a:p>
+            <a:fld id="{8C2E478F-E849-4A8C-AF1F-CBCC78A7CBFA}" type="slidenum">
+              <a:rPr lang="en-US" smtClean="0"/>
+              <a:pPr/>
+              <a:t>4</a:t>
+            </a:fld>
+            <a:endParaRPr lang="en-US" dirty="0"/>
+          </a:p>
+        </p:txBody>
+      </p:sp>
+    </p:spTree>
+    <p:extLst>
+      <p:ext uri="{BB962C8B-B14F-4D97-AF65-F5344CB8AC3E}">
+        <p14:creationId xmlns:p14="http://schemas.microsoft.com/office/powerpoint/2010/main" val="2906922813"/>
+      </p:ext>
+    </p:extLst>
+  </p:cSld>
+  <p:clrMapOvr>
+    <a:masterClrMapping/>
+  </p:clrMapOvr>
+</p:sld>
+</file>
+
+<file path=ppt/slides/slide5.xml><?xml version="1.0" encoding="utf-8"?>
+<p:sld xmlns:a="http://schemas.openxmlformats.org/drawingml/2006/main" xmlns:r="http://schemas.openxmlformats.org/officeDocument/2006/relationships" xmlns:p="http://schemas.openxmlformats.org/presentationml/2006/main">
+  <p:cSld>
+    <p:spTree>
+      <p:nvGrpSpPr>
+        <p:cNvPr id="1" name=""/>
+        <p:cNvGrpSpPr/>
+        <p:nvPr/>
+      </p:nvGrpSpPr>
+      <p:grpSpPr>
+        <a:xfrm>
+          <a:off x="0" y="0"/>
+          <a:ext cx="0" cy="0"/>
+          <a:chOff x="0" y="0"/>
+          <a:chExt cx="0" cy="0"/>
+        </a:xfrm>
+      </p:grpSpPr>
+      <p:sp>
+        <p:nvSpPr>
           <p:cNvPr id="20" name="Rectangle 19">
             <a:extLst>
               <a:ext uri="{FF2B5EF4-FFF2-40B4-BE49-F238E27FC236}">
@@ -12798,7 +15008,7 @@
           <a:p>
             <a:r>
               <a:rPr lang="en-US" dirty="0"/>
-              <a:t>Availability is given as a True/False in the AirBnB calendar. However, while we assume this to be a booking, it can also simply indicate that the listing was made unavailable by the host during those dates.</a:t>
+              <a:t>Availability is given as a True/False in the AirBnB calendar. However, while we assume False to be a booking, it can also indicate that the listing was made unavailable by the host during those dates.</a:t>
             </a:r>
           </a:p>
           <a:p>
@@ -12861,7 +15071,7 @@
             <a:fld id="{8C2E478F-E849-4A8C-AF1F-CBCC78A7CBFA}" type="slidenum">
               <a:rPr lang="en-US" smtClean="0"/>
               <a:pPr/>
-              <a:t>4</a:t>
+              <a:t>5</a:t>
             </a:fld>
             <a:endParaRPr lang="en-US" dirty="0"/>
           </a:p>
@@ -12968,7 +15178,7 @@
 </p:sld>
 </file>
 
-<file path=ppt/slides/slide5.xml><?xml version="1.0" encoding="utf-8"?>
+<file path=ppt/slides/slide6.xml><?xml version="1.0" encoding="utf-8"?>
 <p:sld xmlns:a="http://schemas.openxmlformats.org/drawingml/2006/main" xmlns:r="http://schemas.openxmlformats.org/officeDocument/2006/relationships" xmlns:p="http://schemas.openxmlformats.org/presentationml/2006/main">
   <p:cSld>
     <p:spTree>
@@ -13167,7 +15377,7 @@
             <a:fld id="{8C2E478F-E849-4A8C-AF1F-CBCC78A7CBFA}" type="slidenum">
               <a:rPr lang="en-US" smtClean="0"/>
               <a:pPr/>
-              <a:t>5</a:t>
+              <a:t>6</a:t>
             </a:fld>
             <a:endParaRPr lang="en-US" dirty="0"/>
           </a:p>
@@ -13189,7 +15399,7 @@
             <p:ph sz="quarter" idx="16"/>
             <p:extLst>
               <p:ext uri="{D42A27DB-BD31-4B8C-83A1-F6EECF244321}">
-                <p14:modId xmlns:p14="http://schemas.microsoft.com/office/powerpoint/2010/main" val="3685287584"/>
+                <p14:modId xmlns:p14="http://schemas.microsoft.com/office/powerpoint/2010/main" val="565951430"/>
               </p:ext>
             </p:extLst>
           </p:nvPr>
@@ -13212,14 +15422,14 @@
                     </a:ext>
                   </a:extLst>
                 </a:gridCol>
-                <a:gridCol w="1245551">
+                <a:gridCol w="1384531">
                   <a:extLst>
                     <a:ext uri="{9D8B030D-6E8A-4147-A177-3AD203B41FA5}">
                       <a16:colId xmlns:a16="http://schemas.microsoft.com/office/drawing/2014/main" val="3168964903"/>
                     </a:ext>
                   </a:extLst>
                 </a:gridCol>
-                <a:gridCol w="1514668">
+                <a:gridCol w="1375688">
                   <a:extLst>
                     <a:ext uri="{9D8B030D-6E8A-4147-A177-3AD203B41FA5}">
                       <a16:colId xmlns:a16="http://schemas.microsoft.com/office/drawing/2014/main" val="1727786365"/>
@@ -13640,7 +15850,7 @@
 </p:sld>
 </file>
 
-<file path=ppt/slides/slide6.xml><?xml version="1.0" encoding="utf-8"?>
+<file path=ppt/slides/slide7.xml><?xml version="1.0" encoding="utf-8"?>
 <p:sld xmlns:a="http://schemas.openxmlformats.org/drawingml/2006/main" xmlns:r="http://schemas.openxmlformats.org/officeDocument/2006/relationships" xmlns:p="http://schemas.openxmlformats.org/presentationml/2006/main">
   <p:cSld>
     <p:spTree>
@@ -13836,7 +16046,7 @@
             <a:fld id="{8C2E478F-E849-4A8C-AF1F-CBCC78A7CBFA}" type="slidenum">
               <a:rPr lang="en-US" smtClean="0"/>
               <a:pPr/>
-              <a:t>6</a:t>
+              <a:t>7</a:t>
             </a:fld>
             <a:endParaRPr lang="en-US" dirty="0"/>
           </a:p>
@@ -13885,7 +16095,7 @@
 </p:sld>
 </file>
 
-<file path=ppt/slides/slide7.xml><?xml version="1.0" encoding="utf-8"?>
+<file path=ppt/slides/slide8.xml><?xml version="1.0" encoding="utf-8"?>
 <p:sld xmlns:a="http://schemas.openxmlformats.org/drawingml/2006/main" xmlns:r="http://schemas.openxmlformats.org/officeDocument/2006/relationships" xmlns:p="http://schemas.openxmlformats.org/presentationml/2006/main">
   <p:cSld>
     <p:spTree>
@@ -13989,7 +16199,7 @@
             <a:fld id="{8C2E478F-E849-4A8C-AF1F-CBCC78A7CBFA}" type="slidenum">
               <a:rPr lang="en-US" smtClean="0"/>
               <a:pPr/>
-              <a:t>7</a:t>
+              <a:t>8</a:t>
             </a:fld>
             <a:endParaRPr lang="en-US" dirty="0"/>
           </a:p>
@@ -14141,145 +16351,6 @@
 </p:sld>
 </file>
 
-<file path=ppt/slides/slide8.xml><?xml version="1.0" encoding="utf-8"?>
-<p:sld xmlns:a="http://schemas.openxmlformats.org/drawingml/2006/main" xmlns:r="http://schemas.openxmlformats.org/officeDocument/2006/relationships" xmlns:p="http://schemas.openxmlformats.org/presentationml/2006/main">
-  <p:cSld>
-    <p:spTree>
-      <p:nvGrpSpPr>
-        <p:cNvPr id="1" name=""/>
-        <p:cNvGrpSpPr/>
-        <p:nvPr/>
-      </p:nvGrpSpPr>
-      <p:grpSpPr>
-        <a:xfrm>
-          <a:off x="0" y="0"/>
-          <a:ext cx="0" cy="0"/>
-          <a:chOff x="0" y="0"/>
-          <a:chExt cx="0" cy="0"/>
-        </a:xfrm>
-      </p:grpSpPr>
-      <p:sp>
-        <p:nvSpPr>
-          <p:cNvPr id="2" name="Content Placeholder 1">
-            <a:extLst>
-              <a:ext uri="{FF2B5EF4-FFF2-40B4-BE49-F238E27FC236}">
-                <a16:creationId xmlns:a16="http://schemas.microsoft.com/office/drawing/2014/main" id="{C1745919-55AD-49F8-A160-EFCCB4FE760A}"/>
-              </a:ext>
-            </a:extLst>
-          </p:cNvPr>
-          <p:cNvSpPr>
-            <a:spLocks noGrp="1"/>
-          </p:cNvSpPr>
-          <p:nvPr>
-            <p:ph idx="1"/>
-          </p:nvPr>
-        </p:nvSpPr>
-        <p:spPr/>
-        <p:txBody>
-          <a:bodyPr/>
-          <a:lstStyle/>
-          <a:p>
-            <a:endParaRPr lang="en-AU"/>
-          </a:p>
-        </p:txBody>
-      </p:sp>
-      <p:sp>
-        <p:nvSpPr>
-          <p:cNvPr id="3" name="Title 2">
-            <a:extLst>
-              <a:ext uri="{FF2B5EF4-FFF2-40B4-BE49-F238E27FC236}">
-                <a16:creationId xmlns:a16="http://schemas.microsoft.com/office/drawing/2014/main" id="{C06C2A79-1873-4027-ACE0-E6E3FCD2B2AC}"/>
-              </a:ext>
-            </a:extLst>
-          </p:cNvPr>
-          <p:cNvSpPr>
-            <a:spLocks noGrp="1"/>
-          </p:cNvSpPr>
-          <p:nvPr>
-            <p:ph type="title"/>
-          </p:nvPr>
-        </p:nvSpPr>
-        <p:spPr/>
-        <p:txBody>
-          <a:bodyPr/>
-          <a:lstStyle/>
-          <a:p>
-            <a:endParaRPr lang="en-AU"/>
-          </a:p>
-        </p:txBody>
-      </p:sp>
-      <p:sp>
-        <p:nvSpPr>
-          <p:cNvPr id="4" name="Footer Placeholder 3">
-            <a:extLst>
-              <a:ext uri="{FF2B5EF4-FFF2-40B4-BE49-F238E27FC236}">
-                <a16:creationId xmlns:a16="http://schemas.microsoft.com/office/drawing/2014/main" id="{039DA1F9-741F-4F99-80E3-4F7C03898624}"/>
-              </a:ext>
-            </a:extLst>
-          </p:cNvPr>
-          <p:cNvSpPr>
-            <a:spLocks noGrp="1"/>
-          </p:cNvSpPr>
-          <p:nvPr>
-            <p:ph type="ftr" sz="quarter" idx="10"/>
-          </p:nvPr>
-        </p:nvSpPr>
-        <p:spPr/>
-        <p:txBody>
-          <a:bodyPr/>
-          <a:lstStyle/>
-          <a:p>
-            <a:r>
-              <a:rPr lang="en-US"/>
-              <a:t>Add a Footer</a:t>
-            </a:r>
-            <a:endParaRPr lang="en-US" dirty="0"/>
-          </a:p>
-        </p:txBody>
-      </p:sp>
-      <p:sp>
-        <p:nvSpPr>
-          <p:cNvPr id="5" name="Slide Number Placeholder 4">
-            <a:extLst>
-              <a:ext uri="{FF2B5EF4-FFF2-40B4-BE49-F238E27FC236}">
-                <a16:creationId xmlns:a16="http://schemas.microsoft.com/office/drawing/2014/main" id="{C7953CAA-1A08-4B79-ACBD-6E83AEF5B627}"/>
-              </a:ext>
-            </a:extLst>
-          </p:cNvPr>
-          <p:cNvSpPr>
-            <a:spLocks noGrp="1"/>
-          </p:cNvSpPr>
-          <p:nvPr>
-            <p:ph type="sldNum" sz="quarter" idx="11"/>
-          </p:nvPr>
-        </p:nvSpPr>
-        <p:spPr/>
-        <p:txBody>
-          <a:bodyPr/>
-          <a:lstStyle/>
-          <a:p>
-            <a:fld id="{8C2E478F-E849-4A8C-AF1F-CBCC78A7CBFA}" type="slidenum">
-              <a:rPr lang="en-US" smtClean="0"/>
-              <a:pPr/>
-              <a:t>8</a:t>
-            </a:fld>
-            <a:endParaRPr lang="en-US" dirty="0"/>
-          </a:p>
-        </p:txBody>
-      </p:sp>
-    </p:spTree>
-    <p:extLst>
-      <p:ext uri="{BB962C8B-B14F-4D97-AF65-F5344CB8AC3E}">
-        <p14:creationId xmlns:p14="http://schemas.microsoft.com/office/powerpoint/2010/main" val="2854924587"/>
-      </p:ext>
-    </p:extLst>
-  </p:cSld>
-  <p:clrMapOvr>
-    <a:masterClrMapping/>
-  </p:clrMapOvr>
-</p:sld>
-</file>
-
 <file path=ppt/slides/slide9.xml><?xml version="1.0" encoding="utf-8"?>
 <p:sld xmlns:a="http://schemas.openxmlformats.org/drawingml/2006/main" xmlns:r="http://schemas.openxmlformats.org/officeDocument/2006/relationships" xmlns:p="http://schemas.openxmlformats.org/presentationml/2006/main">
   <p:cSld>
@@ -14297,12 +16368,41 @@
           <a:chExt cx="0" cy="0"/>
         </a:xfrm>
       </p:grpSpPr>
-      <p:sp>
-        <p:nvSpPr>
-          <p:cNvPr id="2" name="Content Placeholder 1">
-            <a:extLst>
-              <a:ext uri="{FF2B5EF4-FFF2-40B4-BE49-F238E27FC236}">
-                <a16:creationId xmlns:a16="http://schemas.microsoft.com/office/drawing/2014/main" id="{14CE08C4-0FC4-46A4-95B6-19B11D951228}"/>
+      <p:pic>
+        <p:nvPicPr>
+          <p:cNvPr id="9" name="Content Placeholder 8" descr="Chart, bar chart&#10;&#10;Description automatically generated">
+            <a:extLst>
+              <a:ext uri="{FF2B5EF4-FFF2-40B4-BE49-F238E27FC236}">
+                <a16:creationId xmlns:a16="http://schemas.microsoft.com/office/drawing/2014/main" id="{00ED4A51-3A29-4AF1-BEFE-D7E956ED27FB}"/>
+              </a:ext>
+            </a:extLst>
+          </p:cNvPr>
+          <p:cNvPicPr>
+            <a:picLocks noGrp="1" noChangeAspect="1"/>
+          </p:cNvPicPr>
+          <p:nvPr>
+            <p:ph sz="quarter" idx="16"/>
+          </p:nvPr>
+        </p:nvPicPr>
+        <p:blipFill>
+          <a:blip r:embed="rId2"/>
+          <a:stretch>
+            <a:fillRect/>
+          </a:stretch>
+        </p:blipFill>
+        <p:spPr>
+          <a:xfrm>
+            <a:off x="6373133" y="909242"/>
+            <a:ext cx="5219700" cy="2609850"/>
+          </a:xfrm>
+        </p:spPr>
+      </p:pic>
+      <p:sp>
+        <p:nvSpPr>
+          <p:cNvPr id="3" name="Title 2">
+            <a:extLst>
+              <a:ext uri="{FF2B5EF4-FFF2-40B4-BE49-F238E27FC236}">
+                <a16:creationId xmlns:a16="http://schemas.microsoft.com/office/drawing/2014/main" id="{8247AA21-854A-4FBF-AB98-0ECF4F6FEAB5}"/>
               </a:ext>
             </a:extLst>
           </p:cNvPr>
@@ -14310,24 +16410,33 @@
             <a:spLocks noGrp="1"/>
           </p:cNvSpPr>
           <p:nvPr>
-            <p:ph sz="quarter" idx="16"/>
-          </p:nvPr>
-        </p:nvSpPr>
-        <p:spPr/>
+            <p:ph type="title"/>
+          </p:nvPr>
+        </p:nvSpPr>
+        <p:spPr>
+          <a:xfrm>
+            <a:off x="599167" y="713874"/>
+            <a:ext cx="4226024" cy="959117"/>
+          </a:xfrm>
+        </p:spPr>
         <p:txBody>
           <a:bodyPr/>
           <a:lstStyle/>
           <a:p>
-            <a:endParaRPr lang="en-AU"/>
-          </a:p>
-        </p:txBody>
-      </p:sp>
-      <p:sp>
-        <p:nvSpPr>
-          <p:cNvPr id="3" name="Title 2">
-            <a:extLst>
-              <a:ext uri="{FF2B5EF4-FFF2-40B4-BE49-F238E27FC236}">
-                <a16:creationId xmlns:a16="http://schemas.microsoft.com/office/drawing/2014/main" id="{963D3CFB-9ABB-4FCD-82E7-9DE87C226AC1}"/>
+            <a:r>
+              <a:rPr lang="en-US" dirty="0"/>
+              <a:t>Airbnb Room Types for 2019 and 2020</a:t>
+            </a:r>
+            <a:endParaRPr lang="en-AU" dirty="0"/>
+          </a:p>
+        </p:txBody>
+      </p:sp>
+      <p:sp>
+        <p:nvSpPr>
+          <p:cNvPr id="4" name="Content Placeholder 3">
+            <a:extLst>
+              <a:ext uri="{FF2B5EF4-FFF2-40B4-BE49-F238E27FC236}">
+                <a16:creationId xmlns:a16="http://schemas.microsoft.com/office/drawing/2014/main" id="{5C5E84DC-E157-4E12-B6CB-CD16D6124EBF}"/>
               </a:ext>
             </a:extLst>
           </p:cNvPr>
@@ -14335,24 +16444,106 @@
             <a:spLocks noGrp="1"/>
           </p:cNvSpPr>
           <p:nvPr>
-            <p:ph type="title"/>
-          </p:nvPr>
-        </p:nvSpPr>
-        <p:spPr/>
-        <p:txBody>
-          <a:bodyPr/>
+            <p:ph idx="1"/>
+          </p:nvPr>
+        </p:nvSpPr>
+        <p:spPr>
+          <a:xfrm>
+            <a:off x="647045" y="1840434"/>
+            <a:ext cx="4226024" cy="3857329"/>
+          </a:xfrm>
+        </p:spPr>
+        <p:txBody>
+          <a:bodyPr>
+            <a:normAutofit lnSpcReduction="10000"/>
+          </a:bodyPr>
           <a:lstStyle/>
           <a:p>
-            <a:endParaRPr lang="en-AU"/>
-          </a:p>
-        </p:txBody>
-      </p:sp>
-      <p:sp>
-        <p:nvSpPr>
-          <p:cNvPr id="4" name="Content Placeholder 3">
-            <a:extLst>
-              <a:ext uri="{FF2B5EF4-FFF2-40B4-BE49-F238E27FC236}">
-                <a16:creationId xmlns:a16="http://schemas.microsoft.com/office/drawing/2014/main" id="{0C9180BE-F25F-46F8-BF1B-4BE6880D120C}"/>
+            <a:r>
+              <a:rPr lang="en-US" b="1" dirty="0"/>
+              <a:t>10 % overall decrease </a:t>
+            </a:r>
+            <a:r>
+              <a:rPr lang="en-US" dirty="0"/>
+              <a:t>in Airbnb listings in 2020</a:t>
+            </a:r>
+            <a:br>
+              <a:rPr lang="en-US" dirty="0"/>
+            </a:br>
+            <a:r>
+              <a:rPr lang="en-US" dirty="0"/>
+              <a:t>Total listings in 2019 : </a:t>
+            </a:r>
+            <a:r>
+              <a:rPr lang="en-US" b="1" dirty="0"/>
+              <a:t>22,895</a:t>
+            </a:r>
+            <a:br>
+              <a:rPr lang="en-US" dirty="0"/>
+            </a:br>
+            <a:r>
+              <a:rPr lang="en-US" dirty="0"/>
+              <a:t>Total listings in 2020 : </a:t>
+            </a:r>
+            <a:r>
+              <a:rPr lang="en-US" b="1" dirty="0"/>
+              <a:t>20,420</a:t>
+            </a:r>
+          </a:p>
+          <a:p>
+            <a:r>
+              <a:rPr lang="en-US" dirty="0"/>
+              <a:t>Majority of listings are under type </a:t>
+            </a:r>
+            <a:r>
+              <a:rPr lang="en-US" b="1" dirty="0"/>
+              <a:t>Entire Home/ Apartment</a:t>
+            </a:r>
+            <a:r>
+              <a:rPr lang="en-US" dirty="0"/>
+              <a:t> for both years 2019 and 2020.</a:t>
+            </a:r>
+          </a:p>
+          <a:p>
+            <a:r>
+              <a:rPr lang="en-US" dirty="0"/>
+              <a:t>Entire Home/ Apartment  and Private Rooms listings have </a:t>
+            </a:r>
+            <a:r>
+              <a:rPr lang="en-US" b="1" dirty="0"/>
+              <a:t>decreased</a:t>
+            </a:r>
+            <a:r>
+              <a:rPr lang="en-US" dirty="0"/>
+              <a:t>. Shared rooms listings have slightly </a:t>
+            </a:r>
+            <a:r>
+              <a:rPr lang="en-US" b="1" dirty="0"/>
+              <a:t>increased</a:t>
+            </a:r>
+            <a:r>
+              <a:rPr lang="en-US" dirty="0"/>
+              <a:t>.</a:t>
+            </a:r>
+          </a:p>
+          <a:p>
+            <a:r>
+              <a:rPr lang="en-US" b="1" dirty="0"/>
+              <a:t>Hotel Rooms </a:t>
+            </a:r>
+            <a:r>
+              <a:rPr lang="en-US" dirty="0"/>
+              <a:t>introduced as Airbnb listing in 2020</a:t>
+            </a:r>
+          </a:p>
+        </p:txBody>
+      </p:sp>
+      <p:sp>
+        <p:nvSpPr>
+          <p:cNvPr id="6" name="Footer Placeholder 5">
+            <a:extLst>
+              <a:ext uri="{FF2B5EF4-FFF2-40B4-BE49-F238E27FC236}">
+                <a16:creationId xmlns:a16="http://schemas.microsoft.com/office/drawing/2014/main" id="{E9821A15-1301-4C8D-9087-3AC108634B98}"/>
               </a:ext>
             </a:extLst>
           </p:cNvPr>
@@ -14360,7 +16551,7 @@
             <a:spLocks noGrp="1"/>
           </p:cNvSpPr>
           <p:nvPr>
-            <p:ph idx="1"/>
+            <p:ph type="ftr" sz="quarter" idx="17"/>
           </p:nvPr>
         </p:nvSpPr>
         <p:spPr/>
@@ -14368,56 +16559,6 @@
           <a:bodyPr/>
           <a:lstStyle/>
           <a:p>
-            <a:endParaRPr lang="en-AU"/>
-          </a:p>
-        </p:txBody>
-      </p:sp>
-      <p:sp>
-        <p:nvSpPr>
-          <p:cNvPr id="5" name="Text Placeholder 4">
-            <a:extLst>
-              <a:ext uri="{FF2B5EF4-FFF2-40B4-BE49-F238E27FC236}">
-                <a16:creationId xmlns:a16="http://schemas.microsoft.com/office/drawing/2014/main" id="{54FA4483-074E-4B21-AD39-EC2553D84A1D}"/>
-              </a:ext>
-            </a:extLst>
-          </p:cNvPr>
-          <p:cNvSpPr>
-            <a:spLocks noGrp="1"/>
-          </p:cNvSpPr>
-          <p:nvPr>
-            <p:ph type="body" idx="13"/>
-          </p:nvPr>
-        </p:nvSpPr>
-        <p:spPr/>
-        <p:txBody>
-          <a:bodyPr/>
-          <a:lstStyle/>
-          <a:p>
-            <a:endParaRPr lang="en-AU"/>
-          </a:p>
-        </p:txBody>
-      </p:sp>
-      <p:sp>
-        <p:nvSpPr>
-          <p:cNvPr id="6" name="Footer Placeholder 5">
-            <a:extLst>
-              <a:ext uri="{FF2B5EF4-FFF2-40B4-BE49-F238E27FC236}">
-                <a16:creationId xmlns:a16="http://schemas.microsoft.com/office/drawing/2014/main" id="{7AFC9C19-83AF-46CD-9C61-BF46A93DCDDF}"/>
-              </a:ext>
-            </a:extLst>
-          </p:cNvPr>
-          <p:cNvSpPr>
-            <a:spLocks noGrp="1"/>
-          </p:cNvSpPr>
-          <p:nvPr>
-            <p:ph type="ftr" sz="quarter" idx="17"/>
-          </p:nvPr>
-        </p:nvSpPr>
-        <p:spPr/>
-        <p:txBody>
-          <a:bodyPr/>
-          <a:lstStyle/>
-          <a:p>
             <a:r>
               <a:rPr lang="en-US"/>
               <a:t>Add a Footer</a:t>
@@ -14431,7 +16572,7 @@
           <p:cNvPr id="7" name="Slide Number Placeholder 6">
             <a:extLst>
               <a:ext uri="{FF2B5EF4-FFF2-40B4-BE49-F238E27FC236}">
-                <a16:creationId xmlns:a16="http://schemas.microsoft.com/office/drawing/2014/main" id="{7B0F959D-3783-4791-872C-A877B2B5D84F}"/>
+                <a16:creationId xmlns:a16="http://schemas.microsoft.com/office/drawing/2014/main" id="{94DD111D-4F27-4A45-9508-947E8BEEE9F9}"/>
               </a:ext>
             </a:extLst>
           </p:cNvPr>
@@ -14456,10 +16597,363 @@
           </a:p>
         </p:txBody>
       </p:sp>
+      <p:pic>
+        <p:nvPicPr>
+          <p:cNvPr id="10" name="Picture 9">
+            <a:extLst>
+              <a:ext uri="{FF2B5EF4-FFF2-40B4-BE49-F238E27FC236}">
+                <a16:creationId xmlns:a16="http://schemas.microsoft.com/office/drawing/2014/main" id="{2A4209EA-49D9-4879-B33A-FDB08E4E1D45}"/>
+              </a:ext>
+            </a:extLst>
+          </p:cNvPr>
+          <p:cNvPicPr>
+            <a:picLocks noChangeAspect="1"/>
+          </p:cNvPicPr>
+          <p:nvPr/>
+        </p:nvPicPr>
+        <p:blipFill>
+          <a:blip r:embed="rId3">
+            <a:extLst>
+              <a:ext uri="{28A0092B-C50C-407E-A947-70E740481C1C}">
+                <a14:useLocalDpi xmlns:a14="http://schemas.microsoft.com/office/drawing/2010/main" val="0"/>
+              </a:ext>
+            </a:extLst>
+          </a:blip>
+          <a:stretch>
+            <a:fillRect/>
+          </a:stretch>
+        </p:blipFill>
+        <p:spPr>
+          <a:xfrm>
+            <a:off x="9517503" y="4073898"/>
+            <a:ext cx="2075330" cy="1503042"/>
+          </a:xfrm>
+          <a:prstGeom prst="rect">
+            <a:avLst/>
+          </a:prstGeom>
+        </p:spPr>
+      </p:pic>
+      <p:pic>
+        <p:nvPicPr>
+          <p:cNvPr id="11" name="Picture 10">
+            <a:extLst>
+              <a:ext uri="{FF2B5EF4-FFF2-40B4-BE49-F238E27FC236}">
+                <a16:creationId xmlns:a16="http://schemas.microsoft.com/office/drawing/2014/main" id="{7AFD9A3A-0FF6-4053-8DD6-8019FE1F28C0}"/>
+              </a:ext>
+            </a:extLst>
+          </p:cNvPr>
+          <p:cNvPicPr>
+            <a:picLocks noChangeAspect="1"/>
+          </p:cNvPicPr>
+          <p:nvPr/>
+        </p:nvPicPr>
+        <p:blipFill>
+          <a:blip r:embed="rId4">
+            <a:extLst>
+              <a:ext uri="{28A0092B-C50C-407E-A947-70E740481C1C}">
+                <a14:useLocalDpi xmlns:a14="http://schemas.microsoft.com/office/drawing/2010/main" val="0"/>
+              </a:ext>
+            </a:extLst>
+          </a:blip>
+          <a:stretch>
+            <a:fillRect/>
+          </a:stretch>
+        </p:blipFill>
+        <p:spPr>
+          <a:xfrm>
+            <a:off x="6373133" y="4073898"/>
+            <a:ext cx="2092418" cy="1503042"/>
+          </a:xfrm>
+          <a:prstGeom prst="rect">
+            <a:avLst/>
+          </a:prstGeom>
+        </p:spPr>
+      </p:pic>
+      <p:sp>
+        <p:nvSpPr>
+          <p:cNvPr id="12" name="Rectangle 11">
+            <a:extLst>
+              <a:ext uri="{FF2B5EF4-FFF2-40B4-BE49-F238E27FC236}">
+                <a16:creationId xmlns:a16="http://schemas.microsoft.com/office/drawing/2014/main" id="{F2C9F2A9-3280-4A3E-8B61-4149DB507FC3}"/>
+              </a:ext>
+            </a:extLst>
+          </p:cNvPr>
+          <p:cNvSpPr/>
+          <p:nvPr/>
+        </p:nvSpPr>
+        <p:spPr>
+          <a:xfrm>
+            <a:off x="9751133" y="3707158"/>
+            <a:ext cx="1636666" cy="276999"/>
+          </a:xfrm>
+          <a:prstGeom prst="rect">
+            <a:avLst/>
+          </a:prstGeom>
+        </p:spPr>
+        <p:txBody>
+          <a:bodyPr wrap="none">
+            <a:spAutoFit/>
+          </a:bodyPr>
+          <a:lstStyle>
+            <a:defPPr>
+              <a:defRPr lang="en-US"/>
+            </a:defPPr>
+            <a:lvl1pPr marL="0" algn="l" defTabSz="914400" rtl="0" eaLnBrk="1" latinLnBrk="0" hangingPunct="1">
+              <a:defRPr sz="1800" kern="1200">
+                <a:solidFill>
+                  <a:schemeClr val="tx1"/>
+                </a:solidFill>
+                <a:latin typeface="+mn-lt"/>
+                <a:ea typeface="+mn-ea"/>
+                <a:cs typeface="+mn-cs"/>
+              </a:defRPr>
+            </a:lvl1pPr>
+            <a:lvl2pPr marL="457200" algn="l" defTabSz="914400" rtl="0" eaLnBrk="1" latinLnBrk="0" hangingPunct="1">
+              <a:defRPr sz="1800" kern="1200">
+                <a:solidFill>
+                  <a:schemeClr val="tx1"/>
+                </a:solidFill>
+                <a:latin typeface="+mn-lt"/>
+                <a:ea typeface="+mn-ea"/>
+                <a:cs typeface="+mn-cs"/>
+              </a:defRPr>
+            </a:lvl2pPr>
+            <a:lvl3pPr marL="914400" algn="l" defTabSz="914400" rtl="0" eaLnBrk="1" latinLnBrk="0" hangingPunct="1">
+              <a:defRPr sz="1800" kern="1200">
+                <a:solidFill>
+                  <a:schemeClr val="tx1"/>
+                </a:solidFill>
+                <a:latin typeface="+mn-lt"/>
+                <a:ea typeface="+mn-ea"/>
+                <a:cs typeface="+mn-cs"/>
+              </a:defRPr>
+            </a:lvl3pPr>
+            <a:lvl4pPr marL="1371600" algn="l" defTabSz="914400" rtl="0" eaLnBrk="1" latinLnBrk="0" hangingPunct="1">
+              <a:defRPr sz="1800" kern="1200">
+                <a:solidFill>
+                  <a:schemeClr val="tx1"/>
+                </a:solidFill>
+                <a:latin typeface="+mn-lt"/>
+                <a:ea typeface="+mn-ea"/>
+                <a:cs typeface="+mn-cs"/>
+              </a:defRPr>
+            </a:lvl4pPr>
+            <a:lvl5pPr marL="1828800" algn="l" defTabSz="914400" rtl="0" eaLnBrk="1" latinLnBrk="0" hangingPunct="1">
+              <a:defRPr sz="1800" kern="1200">
+                <a:solidFill>
+                  <a:schemeClr val="tx1"/>
+                </a:solidFill>
+                <a:latin typeface="+mn-lt"/>
+                <a:ea typeface="+mn-ea"/>
+                <a:cs typeface="+mn-cs"/>
+              </a:defRPr>
+            </a:lvl5pPr>
+            <a:lvl6pPr marL="2286000" algn="l" defTabSz="914400" rtl="0" eaLnBrk="1" latinLnBrk="0" hangingPunct="1">
+              <a:defRPr sz="1800" kern="1200">
+                <a:solidFill>
+                  <a:schemeClr val="tx1"/>
+                </a:solidFill>
+                <a:latin typeface="+mn-lt"/>
+                <a:ea typeface="+mn-ea"/>
+                <a:cs typeface="+mn-cs"/>
+              </a:defRPr>
+            </a:lvl6pPr>
+            <a:lvl7pPr marL="2743200" algn="l" defTabSz="914400" rtl="0" eaLnBrk="1" latinLnBrk="0" hangingPunct="1">
+              <a:defRPr sz="1800" kern="1200">
+                <a:solidFill>
+                  <a:schemeClr val="tx1"/>
+                </a:solidFill>
+                <a:latin typeface="+mn-lt"/>
+                <a:ea typeface="+mn-ea"/>
+                <a:cs typeface="+mn-cs"/>
+              </a:defRPr>
+            </a:lvl7pPr>
+            <a:lvl8pPr marL="3200400" algn="l" defTabSz="914400" rtl="0" eaLnBrk="1" latinLnBrk="0" hangingPunct="1">
+              <a:defRPr sz="1800" kern="1200">
+                <a:solidFill>
+                  <a:schemeClr val="tx1"/>
+                </a:solidFill>
+                <a:latin typeface="+mn-lt"/>
+                <a:ea typeface="+mn-ea"/>
+                <a:cs typeface="+mn-cs"/>
+              </a:defRPr>
+            </a:lvl8pPr>
+            <a:lvl9pPr marL="3657600" algn="l" defTabSz="914400" rtl="0" eaLnBrk="1" latinLnBrk="0" hangingPunct="1">
+              <a:defRPr sz="1800" kern="1200">
+                <a:solidFill>
+                  <a:schemeClr val="tx1"/>
+                </a:solidFill>
+                <a:latin typeface="+mn-lt"/>
+                <a:ea typeface="+mn-ea"/>
+                <a:cs typeface="+mn-cs"/>
+              </a:defRPr>
+            </a:lvl9pPr>
+          </a:lstStyle>
+          <a:p>
+            <a:r>
+              <a:rPr lang="en-GB" sz="1200" b="1" u="sng" dirty="0">
+                <a:ln w="0"/>
+                <a:solidFill>
+                  <a:schemeClr val="accent1"/>
+                </a:solidFill>
+                <a:effectLst>
+                  <a:outerShdw blurRad="38100" dist="25400" dir="5400000" algn="ctr" rotWithShape="0">
+                    <a:srgbClr val="6E747A">
+                      <a:alpha val="43000"/>
+                    </a:srgbClr>
+                  </a:outerShdw>
+                </a:effectLst>
+              </a:rPr>
+              <a:t>Room Listings for 2020</a:t>
+            </a:r>
+          </a:p>
+        </p:txBody>
+      </p:sp>
+      <p:sp>
+        <p:nvSpPr>
+          <p:cNvPr id="13" name="TextBox 10">
+            <a:extLst>
+              <a:ext uri="{FF2B5EF4-FFF2-40B4-BE49-F238E27FC236}">
+                <a16:creationId xmlns:a16="http://schemas.microsoft.com/office/drawing/2014/main" id="{C74D12E2-2D84-4D44-B940-8C5BB2A7271B}"/>
+              </a:ext>
+            </a:extLst>
+          </p:cNvPr>
+          <p:cNvSpPr txBox="1"/>
+          <p:nvPr/>
+        </p:nvSpPr>
+        <p:spPr>
+          <a:xfrm>
+            <a:off x="6493768" y="3707157"/>
+            <a:ext cx="1636666" cy="276999"/>
+          </a:xfrm>
+          <a:prstGeom prst="rect">
+            <a:avLst/>
+          </a:prstGeom>
+          <a:noFill/>
+        </p:spPr>
+        <p:txBody>
+          <a:bodyPr wrap="none" rtlCol="0">
+            <a:spAutoFit/>
+          </a:bodyPr>
+          <a:lstStyle>
+            <a:defPPr>
+              <a:defRPr lang="en-US"/>
+            </a:defPPr>
+            <a:lvl1pPr marL="0" algn="l" defTabSz="914400" rtl="0" eaLnBrk="1" latinLnBrk="0" hangingPunct="1">
+              <a:defRPr sz="1800" kern="1200">
+                <a:solidFill>
+                  <a:schemeClr val="tx1"/>
+                </a:solidFill>
+                <a:latin typeface="+mn-lt"/>
+                <a:ea typeface="+mn-ea"/>
+                <a:cs typeface="+mn-cs"/>
+              </a:defRPr>
+            </a:lvl1pPr>
+            <a:lvl2pPr marL="457200" algn="l" defTabSz="914400" rtl="0" eaLnBrk="1" latinLnBrk="0" hangingPunct="1">
+              <a:defRPr sz="1800" kern="1200">
+                <a:solidFill>
+                  <a:schemeClr val="tx1"/>
+                </a:solidFill>
+                <a:latin typeface="+mn-lt"/>
+                <a:ea typeface="+mn-ea"/>
+                <a:cs typeface="+mn-cs"/>
+              </a:defRPr>
+            </a:lvl2pPr>
+            <a:lvl3pPr marL="914400" algn="l" defTabSz="914400" rtl="0" eaLnBrk="1" latinLnBrk="0" hangingPunct="1">
+              <a:defRPr sz="1800" kern="1200">
+                <a:solidFill>
+                  <a:schemeClr val="tx1"/>
+                </a:solidFill>
+                <a:latin typeface="+mn-lt"/>
+                <a:ea typeface="+mn-ea"/>
+                <a:cs typeface="+mn-cs"/>
+              </a:defRPr>
+            </a:lvl3pPr>
+            <a:lvl4pPr marL="1371600" algn="l" defTabSz="914400" rtl="0" eaLnBrk="1" latinLnBrk="0" hangingPunct="1">
+              <a:defRPr sz="1800" kern="1200">
+                <a:solidFill>
+                  <a:schemeClr val="tx1"/>
+                </a:solidFill>
+                <a:latin typeface="+mn-lt"/>
+                <a:ea typeface="+mn-ea"/>
+                <a:cs typeface="+mn-cs"/>
+              </a:defRPr>
+            </a:lvl4pPr>
+            <a:lvl5pPr marL="1828800" algn="l" defTabSz="914400" rtl="0" eaLnBrk="1" latinLnBrk="0" hangingPunct="1">
+              <a:defRPr sz="1800" kern="1200">
+                <a:solidFill>
+                  <a:schemeClr val="tx1"/>
+                </a:solidFill>
+                <a:latin typeface="+mn-lt"/>
+                <a:ea typeface="+mn-ea"/>
+                <a:cs typeface="+mn-cs"/>
+              </a:defRPr>
+            </a:lvl5pPr>
+            <a:lvl6pPr marL="2286000" algn="l" defTabSz="914400" rtl="0" eaLnBrk="1" latinLnBrk="0" hangingPunct="1">
+              <a:defRPr sz="1800" kern="1200">
+                <a:solidFill>
+                  <a:schemeClr val="tx1"/>
+                </a:solidFill>
+                <a:latin typeface="+mn-lt"/>
+                <a:ea typeface="+mn-ea"/>
+                <a:cs typeface="+mn-cs"/>
+              </a:defRPr>
+            </a:lvl6pPr>
+            <a:lvl7pPr marL="2743200" algn="l" defTabSz="914400" rtl="0" eaLnBrk="1" latinLnBrk="0" hangingPunct="1">
+              <a:defRPr sz="1800" kern="1200">
+                <a:solidFill>
+                  <a:schemeClr val="tx1"/>
+                </a:solidFill>
+                <a:latin typeface="+mn-lt"/>
+                <a:ea typeface="+mn-ea"/>
+                <a:cs typeface="+mn-cs"/>
+              </a:defRPr>
+            </a:lvl7pPr>
+            <a:lvl8pPr marL="3200400" algn="l" defTabSz="914400" rtl="0" eaLnBrk="1" latinLnBrk="0" hangingPunct="1">
+              <a:defRPr sz="1800" kern="1200">
+                <a:solidFill>
+                  <a:schemeClr val="tx1"/>
+                </a:solidFill>
+                <a:latin typeface="+mn-lt"/>
+                <a:ea typeface="+mn-ea"/>
+                <a:cs typeface="+mn-cs"/>
+              </a:defRPr>
+            </a:lvl8pPr>
+            <a:lvl9pPr marL="3657600" algn="l" defTabSz="914400" rtl="0" eaLnBrk="1" latinLnBrk="0" hangingPunct="1">
+              <a:defRPr sz="1800" kern="1200">
+                <a:solidFill>
+                  <a:schemeClr val="tx1"/>
+                </a:solidFill>
+                <a:latin typeface="+mn-lt"/>
+                <a:ea typeface="+mn-ea"/>
+                <a:cs typeface="+mn-cs"/>
+              </a:defRPr>
+            </a:lvl9pPr>
+          </a:lstStyle>
+          <a:p>
+            <a:r>
+              <a:rPr lang="en-GB" sz="1200" b="1" u="sng" dirty="0">
+                <a:ln w="0"/>
+                <a:solidFill>
+                  <a:schemeClr val="accent1"/>
+                </a:solidFill>
+                <a:effectLst>
+                  <a:outerShdw blurRad="38100" dist="25400" dir="5400000" algn="ctr" rotWithShape="0">
+                    <a:srgbClr val="6E747A">
+                      <a:alpha val="43000"/>
+                    </a:srgbClr>
+                  </a:outerShdw>
+                </a:effectLst>
+              </a:rPr>
+              <a:t>Room Listings for 2019</a:t>
+            </a:r>
+          </a:p>
+        </p:txBody>
+      </p:sp>
     </p:spTree>
     <p:extLst>
       <p:ext uri="{BB962C8B-B14F-4D97-AF65-F5344CB8AC3E}">
-        <p14:creationId xmlns:p14="http://schemas.microsoft.com/office/powerpoint/2010/main" val="1851946157"/>
+        <p14:creationId xmlns:p14="http://schemas.microsoft.com/office/powerpoint/2010/main" val="2246427715"/>
       </p:ext>
     </p:extLst>
   </p:cSld>
@@ -15261,12 +17755,12 @@
 </file>
 
 <file path=customXml/item1.xml><?xml version="1.0" encoding="utf-8"?>
-<?mso-contentType ?>
-<FormTemplates xmlns="http://schemas.microsoft.com/sharepoint/v3/contenttype/forms">
-  <Display>DocumentLibraryForm</Display>
-  <Edit>DocumentLibraryForm</Edit>
-  <New>DocumentLibraryForm</New>
-</FormTemplates>
+<p:properties xmlns:p="http://schemas.microsoft.com/office/2006/metadata/properties" xmlns:xsi="http://www.w3.org/2001/XMLSchema-instance" xmlns:pc="http://schemas.microsoft.com/office/infopath/2007/PartnerControls">
+  <documentManagement>
+    <Status xmlns="71af3243-3dd4-4a8d-8c0d-dd76da1f02a5">Not started</Status>
+    <MediaServiceKeyPoints xmlns="71af3243-3dd4-4a8d-8c0d-dd76da1f02a5" xsi:nil="true"/>
+  </documentManagement>
+</p:properties>
 </file>
 
 <file path=customXml/item2.xml><?xml version="1.0" encoding="utf-8"?>
@@ -15491,18 +17985,20 @@
 </file>
 
 <file path=customXml/item3.xml><?xml version="1.0" encoding="utf-8"?>
-<p:properties xmlns:p="http://schemas.microsoft.com/office/2006/metadata/properties" xmlns:xsi="http://www.w3.org/2001/XMLSchema-instance" xmlns:pc="http://schemas.microsoft.com/office/infopath/2007/PartnerControls">
-  <documentManagement>
-    <Status xmlns="71af3243-3dd4-4a8d-8c0d-dd76da1f02a5">Not started</Status>
-    <MediaServiceKeyPoints xmlns="71af3243-3dd4-4a8d-8c0d-dd76da1f02a5" xsi:nil="true"/>
-  </documentManagement>
-</p:properties>
+<?mso-contentType ?>
+<FormTemplates xmlns="http://schemas.microsoft.com/sharepoint/v3/contenttype/forms">
+  <Display>DocumentLibraryForm</Display>
+  <Edit>DocumentLibraryForm</Edit>
+  <New>DocumentLibraryForm</New>
+</FormTemplates>
 </file>
 
 <file path=customXml/itemProps1.xml><?xml version="1.0" encoding="utf-8"?>
-<ds:datastoreItem xmlns:ds="http://schemas.openxmlformats.org/officeDocument/2006/customXml" ds:itemID="{26A0F1FB-B1B3-48EC-BFEE-FC0094A34C28}">
+<ds:datastoreItem xmlns:ds="http://schemas.openxmlformats.org/officeDocument/2006/customXml" ds:itemID="{471340EA-4D3D-470F-B5D6-C0F623079401}">
   <ds:schemaRefs>
-    <ds:schemaRef ds:uri="http://schemas.microsoft.com/sharepoint/v3/contenttype/forms"/>
+    <ds:schemaRef ds:uri="http://schemas.microsoft.com/office/2006/metadata/properties"/>
+    <ds:schemaRef ds:uri="http://schemas.microsoft.com/office/infopath/2007/PartnerControls"/>
+    <ds:schemaRef ds:uri="71af3243-3dd4-4a8d-8c0d-dd76da1f02a5"/>
   </ds:schemaRefs>
 </ds:datastoreItem>
 </file>
@@ -15527,11 +18023,9 @@
 </file>
 
 <file path=customXml/itemProps3.xml><?xml version="1.0" encoding="utf-8"?>
-<ds:datastoreItem xmlns:ds="http://schemas.openxmlformats.org/officeDocument/2006/customXml" ds:itemID="{471340EA-4D3D-470F-B5D6-C0F623079401}">
+<ds:datastoreItem xmlns:ds="http://schemas.openxmlformats.org/officeDocument/2006/customXml" ds:itemID="{26A0F1FB-B1B3-48EC-BFEE-FC0094A34C28}">
   <ds:schemaRefs>
-    <ds:schemaRef ds:uri="http://schemas.microsoft.com/office/2006/metadata/properties"/>
-    <ds:schemaRef ds:uri="http://schemas.microsoft.com/office/infopath/2007/PartnerControls"/>
-    <ds:schemaRef ds:uri="71af3243-3dd4-4a8d-8c0d-dd76da1f02a5"/>
+    <ds:schemaRef ds:uri="http://schemas.microsoft.com/sharepoint/v3/contenttype/forms"/>
   </ds:schemaRefs>
 </ds:datastoreItem>
 </file>
</xml_diff>

<commit_message>
Added slide to ppt and summary in notebook
</commit_message>
<xml_diff>
--- a/AirBnb Project - Sherin, Neena and Cody.pptx
+++ b/AirBnb Project - Sherin, Neena and Cody.pptx
@@ -11509,7 +11509,7 @@
           <a:p>
             <a:r>
               <a:rPr lang="en-AU" dirty="0"/>
-              <a:t>There is moderate correlation between Host Response Rate and Number of Days booked for a listing in </a:t>
+              <a:t>There is moderate negative correlation between Host Response Rate and Number of Days booked for a listing in </a:t>
             </a:r>
             <a:r>
               <a:rPr lang="en-AU" dirty="0" err="1"/>
@@ -11522,6 +11522,10 @@
             <a:endParaRPr lang="en-AU" dirty="0"/>
           </a:p>
           <a:p>
+            <a:r>
+              <a:rPr lang="en-AU" dirty="0"/>
+              <a:t>This was not expected and one of the reason for negative correlation could be the increased responses required with increased bookings.</a:t>
+            </a:r>
             <a:endParaRPr lang="en-AU" dirty="0"/>
           </a:p>
         </p:txBody>

</xml_diff>

<commit_message>
minor change in description
</commit_message>
<xml_diff>
--- a/AirBnb Project - Sherin, Neena and Cody.pptx
+++ b/AirBnb Project - Sherin, Neena and Cody.pptx
@@ -12582,7 +12582,23 @@
             </a:pPr>
             <a:r>
               <a:rPr lang="en-US" dirty="0"/>
-              <a:t>Our project aimed to look at available data for Melbourne AirBnB listings across 2019 and 2020 to identify trends in availability, room types offered and whether price or other factors affect a host’s review score.</a:t>
+              <a:t>Our project aimed to look at available data for Melbourne AirBnB listings across 2019 and 2020 to identify trends in availability, room types offered and whether price or other factors affect </a:t>
+            </a:r>
+            <a:r>
+              <a:rPr lang="en-AU" altLang="en-US" dirty="0"/>
+              <a:t>bookings </a:t>
+            </a:r>
+            <a:r>
+              <a:rPr lang="en-US" dirty="0"/>
+              <a:t>a</a:t>
+            </a:r>
+            <a:r>
+              <a:rPr lang="en-AU" altLang="en-US" dirty="0"/>
+              <a:t>nd</a:t>
+            </a:r>
+            <a:r>
+              <a:rPr lang="en-US" dirty="0"/>
+              <a:t> review score.</a:t>
             </a:r>
             <a:endParaRPr lang="en-US" dirty="0"/>
           </a:p>

</xml_diff>

<commit_message>
Updated rounding on one table in Jupyter notebook.
</commit_message>
<xml_diff>
--- a/AirBnb Project - Sherin, Neena and Cody.pptx
+++ b/AirBnb Project - Sherin, Neena and Cody.pptx
@@ -9419,28 +9419,6 @@
       </p:sp>
       <p:sp>
         <p:nvSpPr>
-          <p:cNvPr id="3" name="Footer Placeholder 2"/>
-          <p:cNvSpPr>
-            <a:spLocks noGrp="1"/>
-          </p:cNvSpPr>
-          <p:nvPr>
-            <p:ph type="ftr" sz="quarter" idx="16"/>
-          </p:nvPr>
-        </p:nvSpPr>
-        <p:spPr/>
-        <p:txBody>
-          <a:bodyPr/>
-          <a:lstStyle/>
-          <a:p>
-            <a:r>
-              <a:rPr lang="en-US" dirty="0"/>
-              <a:t>Add a Footer</a:t>
-            </a:r>
-          </a:p>
-        </p:txBody>
-      </p:sp>
-      <p:sp>
-        <p:nvSpPr>
           <p:cNvPr id="11" name="Rectangle: Single Corner Snipped 10" descr="Footer accent box"/>
           <p:cNvSpPr/>
           <p:nvPr/>
@@ -12755,28 +12733,6 @@
         </p:blipFill>
         <p:spPr/>
       </p:pic>
-      <p:sp>
-        <p:nvSpPr>
-          <p:cNvPr id="2" name="Footer Placeholder 1"/>
-          <p:cNvSpPr>
-            <a:spLocks noGrp="1"/>
-          </p:cNvSpPr>
-          <p:nvPr>
-            <p:ph type="ftr" sz="quarter" idx="14"/>
-          </p:nvPr>
-        </p:nvSpPr>
-        <p:spPr/>
-        <p:txBody>
-          <a:bodyPr/>
-          <a:lstStyle/>
-          <a:p>
-            <a:r>
-              <a:rPr lang="en-US" dirty="0"/>
-              <a:t>Add a Footer</a:t>
-            </a:r>
-          </a:p>
-        </p:txBody>
-      </p:sp>
       <p:sp>
         <p:nvSpPr>
           <p:cNvPr id="10" name="Rectangle: Single Corner Snipped 9" descr="Footer accent box"/>
@@ -13283,28 +13239,6 @@
       </p:sp>
       <p:sp>
         <p:nvSpPr>
-          <p:cNvPr id="2" name="Footer Placeholder 1"/>
-          <p:cNvSpPr>
-            <a:spLocks noGrp="1"/>
-          </p:cNvSpPr>
-          <p:nvPr>
-            <p:ph type="ftr" sz="quarter" idx="16"/>
-          </p:nvPr>
-        </p:nvSpPr>
-        <p:spPr/>
-        <p:txBody>
-          <a:bodyPr/>
-          <a:lstStyle/>
-          <a:p>
-            <a:r>
-              <a:rPr lang="en-US" dirty="0"/>
-              <a:t>Add a Footer</a:t>
-            </a:r>
-          </a:p>
-        </p:txBody>
-      </p:sp>
-      <p:sp>
-        <p:nvSpPr>
           <p:cNvPr id="3" name="Slide Number Placeholder 2"/>
           <p:cNvSpPr>
             <a:spLocks noGrp="1"/>
@@ -13479,28 +13413,6 @@
         </p:blipFill>
         <p:spPr/>
       </p:pic>
-      <p:sp>
-        <p:nvSpPr>
-          <p:cNvPr id="2" name="Footer Placeholder 1"/>
-          <p:cNvSpPr>
-            <a:spLocks noGrp="1"/>
-          </p:cNvSpPr>
-          <p:nvPr>
-            <p:ph type="ftr" sz="quarter" idx="14"/>
-          </p:nvPr>
-        </p:nvSpPr>
-        <p:spPr/>
-        <p:txBody>
-          <a:bodyPr/>
-          <a:lstStyle/>
-          <a:p>
-            <a:r>
-              <a:rPr lang="en-US" dirty="0"/>
-              <a:t>Add a Footer</a:t>
-            </a:r>
-          </a:p>
-        </p:txBody>
-      </p:sp>
       <p:sp>
         <p:nvSpPr>
           <p:cNvPr id="10" name="Rectangle: Single Corner Snipped 9" descr="Footer accent box"/>
@@ -13729,28 +13641,6 @@
             <a:r>
               <a:rPr lang="en-US" dirty="0"/>
               <a:t>Pricing data presents extreme outliers within the dataset, this is likely because some bookings are only made available for long term stays, but their host has listed that price as the daily price.</a:t>
-            </a:r>
-          </a:p>
-        </p:txBody>
-      </p:sp>
-      <p:sp>
-        <p:nvSpPr>
-          <p:cNvPr id="2" name="Footer Placeholder 1"/>
-          <p:cNvSpPr>
-            <a:spLocks noGrp="1"/>
-          </p:cNvSpPr>
-          <p:nvPr>
-            <p:ph type="ftr" sz="quarter" idx="16"/>
-          </p:nvPr>
-        </p:nvSpPr>
-        <p:spPr/>
-        <p:txBody>
-          <a:bodyPr/>
-          <a:lstStyle/>
-          <a:p>
-            <a:r>
-              <a:rPr lang="en-US" dirty="0"/>
-              <a:t>Add a Footer</a:t>
             </a:r>
           </a:p>
         </p:txBody>
@@ -13987,28 +13877,6 @@
             <a:r>
               <a:rPr lang="en-US" dirty="0"/>
               <a:t>This means that AirBnB lost 2,475 listings between the two data scrapes.</a:t>
-            </a:r>
-          </a:p>
-        </p:txBody>
-      </p:sp>
-      <p:sp>
-        <p:nvSpPr>
-          <p:cNvPr id="11" name="Footer Placeholder 10"/>
-          <p:cNvSpPr>
-            <a:spLocks noGrp="1"/>
-          </p:cNvSpPr>
-          <p:nvPr>
-            <p:ph type="ftr" sz="quarter" idx="17"/>
-          </p:nvPr>
-        </p:nvSpPr>
-        <p:spPr/>
-        <p:txBody>
-          <a:bodyPr/>
-          <a:lstStyle/>
-          <a:p>
-            <a:r>
-              <a:rPr lang="en-US" dirty="0"/>
-              <a:t>Add a Footer</a:t>
             </a:r>
           </a:p>
         </p:txBody>
@@ -14615,28 +14483,6 @@
       </p:sp>
       <p:sp>
         <p:nvSpPr>
-          <p:cNvPr id="2" name="Footer Placeholder 1"/>
-          <p:cNvSpPr>
-            <a:spLocks noGrp="1"/>
-          </p:cNvSpPr>
-          <p:nvPr>
-            <p:ph type="ftr" sz="quarter" idx="10"/>
-          </p:nvPr>
-        </p:nvSpPr>
-        <p:spPr/>
-        <p:txBody>
-          <a:bodyPr/>
-          <a:lstStyle/>
-          <a:p>
-            <a:r>
-              <a:rPr lang="en-US" dirty="0"/>
-              <a:t>Add a Footer</a:t>
-            </a:r>
-          </a:p>
-        </p:txBody>
-      </p:sp>
-      <p:sp>
-        <p:nvSpPr>
           <p:cNvPr id="3" name="Slide Number Placeholder 2"/>
           <p:cNvSpPr>
             <a:spLocks noGrp="1"/>
@@ -14732,29 +14578,6 @@
               <a:rPr lang="en-AU" dirty="0"/>
               <a:t>Listings – Heatmap of Prices</a:t>
             </a:r>
-          </a:p>
-        </p:txBody>
-      </p:sp>
-      <p:sp>
-        <p:nvSpPr>
-          <p:cNvPr id="4" name="Footer Placeholder 3"/>
-          <p:cNvSpPr>
-            <a:spLocks noGrp="1"/>
-          </p:cNvSpPr>
-          <p:nvPr>
-            <p:ph type="ftr" sz="quarter" idx="10"/>
-          </p:nvPr>
-        </p:nvSpPr>
-        <p:spPr/>
-        <p:txBody>
-          <a:bodyPr/>
-          <a:lstStyle/>
-          <a:p>
-            <a:r>
-              <a:rPr lang="en-US"/>
-              <a:t>Add a Footer</a:t>
-            </a:r>
-            <a:endParaRPr lang="en-US" dirty="0"/>
           </a:p>
         </p:txBody>
       </p:sp>
@@ -14831,6 +14654,76 @@
           </a:prstGeom>
         </p:spPr>
       </p:pic>
+      <p:sp>
+        <p:nvSpPr>
+          <p:cNvPr id="2" name="TextBox 1">
+            <a:extLst>
+              <a:ext uri="{FF2B5EF4-FFF2-40B4-BE49-F238E27FC236}">
+                <a16:creationId xmlns:a16="http://schemas.microsoft.com/office/drawing/2014/main" id="{168943CD-C109-44C4-8300-CBB352FF143B}"/>
+              </a:ext>
+            </a:extLst>
+          </p:cNvPr>
+          <p:cNvSpPr txBox="1"/>
+          <p:nvPr/>
+        </p:nvSpPr>
+        <p:spPr>
+          <a:xfrm>
+            <a:off x="200026" y="935851"/>
+            <a:ext cx="788986" cy="369332"/>
+          </a:xfrm>
+          <a:prstGeom prst="rect">
+            <a:avLst/>
+          </a:prstGeom>
+          <a:noFill/>
+        </p:spPr>
+        <p:txBody>
+          <a:bodyPr wrap="square" rtlCol="0">
+            <a:spAutoFit/>
+          </a:bodyPr>
+          <a:lstStyle/>
+          <a:p>
+            <a:r>
+              <a:rPr lang="en-AU" dirty="0"/>
+              <a:t>2019</a:t>
+            </a:r>
+          </a:p>
+        </p:txBody>
+      </p:sp>
+      <p:sp>
+        <p:nvSpPr>
+          <p:cNvPr id="8" name="TextBox 7">
+            <a:extLst>
+              <a:ext uri="{FF2B5EF4-FFF2-40B4-BE49-F238E27FC236}">
+                <a16:creationId xmlns:a16="http://schemas.microsoft.com/office/drawing/2014/main" id="{4E1A79E9-D948-4FC1-A689-5855C47036A3}"/>
+              </a:ext>
+            </a:extLst>
+          </p:cNvPr>
+          <p:cNvSpPr txBox="1"/>
+          <p:nvPr/>
+        </p:nvSpPr>
+        <p:spPr>
+          <a:xfrm>
+            <a:off x="4822878" y="2813478"/>
+            <a:ext cx="788986" cy="369332"/>
+          </a:xfrm>
+          <a:prstGeom prst="rect">
+            <a:avLst/>
+          </a:prstGeom>
+          <a:noFill/>
+        </p:spPr>
+        <p:txBody>
+          <a:bodyPr wrap="square" rtlCol="0">
+            <a:spAutoFit/>
+          </a:bodyPr>
+          <a:lstStyle/>
+          <a:p>
+            <a:r>
+              <a:rPr lang="en-AU" dirty="0"/>
+              <a:t>2020</a:t>
+            </a:r>
+          </a:p>
+        </p:txBody>
+      </p:sp>
     </p:spTree>
   </p:cSld>
   <p:clrMapOvr>
@@ -14883,6 +14776,33 @@
                                   </p:childTnLst>
                                 </p:cTn>
                               </p:par>
+                              <p:par>
+                                <p:cTn id="7" presetID="1" presetClass="entr" presetSubtype="0" fill="hold" grpId="0" nodeType="withEffect">
+                                  <p:stCondLst>
+                                    <p:cond delay="0"/>
+                                  </p:stCondLst>
+                                  <p:childTnLst>
+                                    <p:set>
+                                      <p:cBhvr>
+                                        <p:cTn id="8" dur="1" fill="hold">
+                                          <p:stCondLst>
+                                            <p:cond delay="0"/>
+                                          </p:stCondLst>
+                                        </p:cTn>
+                                        <p:tgtEl>
+                                          <p:spTgt spid="8"/>
+                                        </p:tgtEl>
+                                        <p:attrNameLst>
+                                          <p:attrName>style.visibility</p:attrName>
+                                        </p:attrNameLst>
+                                      </p:cBhvr>
+                                      <p:to>
+                                        <p:strVal val="visible"/>
+                                      </p:to>
+                                    </p:set>
+                                  </p:childTnLst>
+                                </p:cTn>
+                              </p:par>
                             </p:childTnLst>
                           </p:cTn>
                         </p:par>
@@ -14910,6 +14830,9 @@
         </p:cTn>
       </p:par>
     </p:tnLst>
+    <p:bldLst>
+      <p:bldP spid="8" grpId="0"/>
+    </p:bldLst>
   </p:timing>
 </p:sld>
 </file>

</xml_diff>

<commit_message>
Updated hypotheses in PowerPoint slides.
</commit_message>
<xml_diff>
--- a/AirBnb Project - Sherin, Neena and Cody.pptx
+++ b/AirBnb Project - Sherin, Neena and Cody.pptx
@@ -13360,18 +13360,59 @@
             </a:pPr>
             <a:r>
               <a:rPr lang="en-US" dirty="0"/>
-              <a:t>Our initial thoughts were that the data from 2020 would show a significant impact in reduced listings and decreased availability in the listings.</a:t>
-            </a:r>
-          </a:p>
-          <a:p>
-            <a:pPr>
+              <a:t>We expected to see:</a:t>
+            </a:r>
+          </a:p>
+          <a:p>
+            <a:pPr marL="285750" indent="-285750">
               <a:lnSpc>
                 <a:spcPct val="100000"/>
               </a:lnSpc>
+              <a:buFont typeface="Arial" panose="020B0604020202020204" pitchFamily="34" charset="0"/>
+              <a:buChar char="•"/>
             </a:pPr>
             <a:r>
               <a:rPr lang="en-US" dirty="0"/>
-              <a:t>We also expected to see Melbourne City be the most booked location for AirBnB’s.</a:t>
+              <a:t>Melbourne City having the largest volume of listings</a:t>
+            </a:r>
+          </a:p>
+          <a:p>
+            <a:pPr marL="285750" indent="-285750">
+              <a:lnSpc>
+                <a:spcPct val="100000"/>
+              </a:lnSpc>
+              <a:buFont typeface="Arial" panose="020B0604020202020204" pitchFamily="34" charset="0"/>
+              <a:buChar char="•"/>
+            </a:pPr>
+            <a:r>
+              <a:rPr lang="en-US" dirty="0"/>
+              <a:t>Melbourne City having the least availability in each listing across 2019/2020</a:t>
+            </a:r>
+          </a:p>
+          <a:p>
+            <a:pPr marL="285750" indent="-285750">
+              <a:lnSpc>
+                <a:spcPct val="100000"/>
+              </a:lnSpc>
+              <a:buFont typeface="Arial" panose="020B0604020202020204" pitchFamily="34" charset="0"/>
+              <a:buChar char="•"/>
+            </a:pPr>
+            <a:r>
+              <a:rPr lang="en-US" dirty="0"/>
+              <a:t>A decrease in listings from 2019 to 2020, especially in Entire Homes/Apartments and in Shared Rooms</a:t>
+            </a:r>
+          </a:p>
+          <a:p>
+            <a:pPr marL="285750" indent="-285750">
+              <a:lnSpc>
+                <a:spcPct val="100000"/>
+              </a:lnSpc>
+              <a:buFont typeface="Arial" panose="020B0604020202020204" pitchFamily="34" charset="0"/>
+              <a:buChar char="•"/>
+            </a:pPr>
+            <a:r>
+              <a:rPr lang="en-US" dirty="0"/>
+              <a:t>A relationship between price per night and number of days booked, lower nightly price to more days booked</a:t>
             </a:r>
           </a:p>
           <a:p>
@@ -14646,7 +14687,7 @@
         </p:blipFill>
         <p:spPr>
           <a:xfrm>
-            <a:off x="4822878" y="2708842"/>
+            <a:off x="4822878" y="2688964"/>
             <a:ext cx="7254822" cy="4124586"/>
           </a:xfrm>
           <a:prstGeom prst="rect">
@@ -14703,7 +14744,7 @@
         </p:nvSpPr>
         <p:spPr>
           <a:xfrm>
-            <a:off x="4822878" y="2813478"/>
+            <a:off x="4822878" y="2755405"/>
             <a:ext cx="788986" cy="369332"/>
           </a:xfrm>
           <a:prstGeom prst="rect">

</xml_diff>

<commit_message>
Updated powerpoint presentation with group names.
</commit_message>
<xml_diff>
--- a/AirBnb Project - Sherin, Neena and Cody.pptx
+++ b/AirBnb Project - Sherin, Neena and Cody.pptx
@@ -9383,15 +9383,25 @@
             <p:ph type="title"/>
           </p:nvPr>
         </p:nvSpPr>
-        <p:spPr/>
+        <p:spPr>
+          <a:xfrm>
+            <a:off x="814137" y="1403690"/>
+            <a:ext cx="4351911" cy="2384466"/>
+          </a:xfrm>
+        </p:spPr>
         <p:txBody>
           <a:bodyPr/>
           <a:lstStyle/>
           <a:p>
             <a:r>
               <a:rPr lang="en-US" dirty="0"/>
-              <a:t>Melbourne AirBnB</a:t>
-            </a:r>
+              <a:t>Melbourne </a:t>
+            </a:r>
+            <a:r>
+              <a:rPr lang="en-US" dirty="0" err="1"/>
+              <a:t>AirBnB</a:t>
+            </a:r>
+            <a:endParaRPr lang="en-US" dirty="0"/>
           </a:p>
         </p:txBody>
       </p:sp>
@@ -9405,7 +9415,12 @@
             <p:ph type="body" idx="13"/>
           </p:nvPr>
         </p:nvSpPr>
-        <p:spPr/>
+        <p:spPr>
+          <a:xfrm>
+            <a:off x="883523" y="3362581"/>
+            <a:ext cx="4351910" cy="296437"/>
+          </a:xfrm>
+        </p:spPr>
         <p:txBody>
           <a:bodyPr/>
           <a:lstStyle/>
@@ -9413,6 +9428,27 @@
             <a:r>
               <a:rPr lang="en-US" dirty="0"/>
               <a:t>2019 vs 2020</a:t>
+            </a:r>
+          </a:p>
+          <a:p>
+            <a:endParaRPr lang="en-US" dirty="0"/>
+          </a:p>
+          <a:p>
+            <a:r>
+              <a:rPr lang="en-US" dirty="0" err="1"/>
+              <a:t>Sherin</a:t>
+            </a:r>
+            <a:r>
+              <a:rPr lang="en-US" dirty="0"/>
+              <a:t>, </a:t>
+            </a:r>
+            <a:r>
+              <a:rPr lang="en-US" dirty="0" err="1"/>
+              <a:t>Neena</a:t>
+            </a:r>
+            <a:r>
+              <a:rPr lang="en-US" dirty="0"/>
+              <a:t> &amp; Cody</a:t>
             </a:r>
           </a:p>
         </p:txBody>
@@ -12573,7 +12609,7 @@
             </a:pPr>
             <a:r>
               <a:rPr lang="en-US" dirty="0"/>
-              <a:t>Our project aimed to look at available data for Melbourne AirBnB listings across 2019 and 2020 to identify trends in availability, room types offered and whether price or other factors affect </a:t>
+              <a:t>Our project aimed to look at available data for Melbourne AirBnB listings across 2019 and 2020 to identify trends in availability, room types offered post-COVID and whether price or other factors affect </a:t>
             </a:r>
             <a:r>
               <a:rPr lang="en-AU" altLang="en-US" dirty="0"/>
@@ -12652,7 +12688,7 @@
             </a:pPr>
             <a:r>
               <a:rPr lang="en-US" dirty="0"/>
-              <a:t>How does the price of these room types vary across suburbs</a:t>
+              <a:t>How does the price of these room types vary across areas</a:t>
             </a:r>
           </a:p>
           <a:p>
@@ -13953,6 +13989,11 @@
           </p:cNvGraphicFramePr>
           <p:nvPr>
             <p:ph sz="quarter" idx="16"/>
+            <p:extLst>
+              <p:ext uri="{D42A27DB-BD31-4B8C-83A1-F6EECF244321}">
+                <p14:modId xmlns:p14="http://schemas.microsoft.com/office/powerpoint/2010/main" val="1033313008"/>
+              </p:ext>
+            </p:extLst>
           </p:nvPr>
         </p:nvGraphicFramePr>
         <p:xfrm>

</xml_diff>